<commit_message>
méthodes et méthodes pointers
</commit_message>
<xml_diff>
--- a/PPT/OOPAndGo.pptx
+++ b/PPT/OOPAndGo.pptx
@@ -4,6 +4,9 @@
   <p:sldMasterIdLst>
     <p:sldMasterId id="2147483660" r:id="rId1"/>
   </p:sldMasterIdLst>
+  <p:notesMasterIdLst>
+    <p:notesMasterId r:id="rId18"/>
+  </p:notesMasterIdLst>
   <p:sldIdLst>
     <p:sldId id="256" r:id="rId2"/>
     <p:sldId id="257" r:id="rId3"/>
@@ -12,12 +15,15 @@
     <p:sldId id="269" r:id="rId6"/>
     <p:sldId id="261" r:id="rId7"/>
     <p:sldId id="260" r:id="rId8"/>
-    <p:sldId id="262" r:id="rId9"/>
-    <p:sldId id="263" r:id="rId10"/>
-    <p:sldId id="264" r:id="rId11"/>
-    <p:sldId id="265" r:id="rId12"/>
-    <p:sldId id="266" r:id="rId13"/>
-    <p:sldId id="267" r:id="rId14"/>
+    <p:sldId id="270" r:id="rId9"/>
+    <p:sldId id="271" r:id="rId10"/>
+    <p:sldId id="272" r:id="rId11"/>
+    <p:sldId id="262" r:id="rId12"/>
+    <p:sldId id="263" r:id="rId13"/>
+    <p:sldId id="264" r:id="rId14"/>
+    <p:sldId id="265" r:id="rId15"/>
+    <p:sldId id="266" r:id="rId16"/>
+    <p:sldId id="267" r:id="rId17"/>
   </p:sldIdLst>
   <p:sldSz cx="12192000" cy="6858000"/>
   <p:notesSz cx="6858000" cy="9144000"/>
@@ -122,6 +128,458 @@
     </p:ext>
   </p:extLst>
 </p:presentation>
+</file>
+
+<file path=ppt/notesMasters/notesMaster1.xml><?xml version="1.0" encoding="utf-8"?>
+<p:notesMaster xmlns:a="http://schemas.openxmlformats.org/drawingml/2006/main" xmlns:r="http://schemas.openxmlformats.org/officeDocument/2006/relationships" xmlns:p="http://schemas.openxmlformats.org/presentationml/2006/main">
+  <p:cSld>
+    <p:bg>
+      <p:bgRef idx="1001">
+        <a:schemeClr val="bg1"/>
+      </p:bgRef>
+    </p:bg>
+    <p:spTree>
+      <p:nvGrpSpPr>
+        <p:cNvPr id="1" name=""/>
+        <p:cNvGrpSpPr/>
+        <p:nvPr/>
+      </p:nvGrpSpPr>
+      <p:grpSpPr>
+        <a:xfrm>
+          <a:off x="0" y="0"/>
+          <a:ext cx="0" cy="0"/>
+          <a:chOff x="0" y="0"/>
+          <a:chExt cx="0" cy="0"/>
+        </a:xfrm>
+      </p:grpSpPr>
+      <p:sp>
+        <p:nvSpPr>
+          <p:cNvPr id="2" name="Espace réservé de l'en-tête 1"/>
+          <p:cNvSpPr>
+            <a:spLocks noGrp="1"/>
+          </p:cNvSpPr>
+          <p:nvPr>
+            <p:ph type="hdr" sz="quarter"/>
+          </p:nvPr>
+        </p:nvSpPr>
+        <p:spPr>
+          <a:xfrm>
+            <a:off x="0" y="0"/>
+            <a:ext cx="2971800" cy="458788"/>
+          </a:xfrm>
+          <a:prstGeom prst="rect">
+            <a:avLst/>
+          </a:prstGeom>
+        </p:spPr>
+        <p:txBody>
+          <a:bodyPr vert="horz" lIns="91440" tIns="45720" rIns="91440" bIns="45720" rtlCol="0"/>
+          <a:lstStyle>
+            <a:lvl1pPr algn="l">
+              <a:defRPr sz="1200"/>
+            </a:lvl1pPr>
+          </a:lstStyle>
+          <a:p>
+            <a:endParaRPr lang="en-GB"/>
+          </a:p>
+        </p:txBody>
+      </p:sp>
+      <p:sp>
+        <p:nvSpPr>
+          <p:cNvPr id="3" name="Espace réservé de la date 2"/>
+          <p:cNvSpPr>
+            <a:spLocks noGrp="1"/>
+          </p:cNvSpPr>
+          <p:nvPr>
+            <p:ph type="dt" idx="1"/>
+          </p:nvPr>
+        </p:nvSpPr>
+        <p:spPr>
+          <a:xfrm>
+            <a:off x="3884613" y="0"/>
+            <a:ext cx="2971800" cy="458788"/>
+          </a:xfrm>
+          <a:prstGeom prst="rect">
+            <a:avLst/>
+          </a:prstGeom>
+        </p:spPr>
+        <p:txBody>
+          <a:bodyPr vert="horz" lIns="91440" tIns="45720" rIns="91440" bIns="45720" rtlCol="0"/>
+          <a:lstStyle>
+            <a:lvl1pPr algn="r">
+              <a:defRPr sz="1200"/>
+            </a:lvl1pPr>
+          </a:lstStyle>
+          <a:p>
+            <a:fld id="{5704045B-0300-40B8-906E-48019F9F7CEB}" type="datetimeFigureOut">
+              <a:rPr lang="en-GB" smtClean="0"/>
+              <a:t>07/11/2019</a:t>
+            </a:fld>
+            <a:endParaRPr lang="en-GB"/>
+          </a:p>
+        </p:txBody>
+      </p:sp>
+      <p:sp>
+        <p:nvSpPr>
+          <p:cNvPr id="4" name="Espace réservé de l'image des diapositives 3"/>
+          <p:cNvSpPr>
+            <a:spLocks noGrp="1" noRot="1" noChangeAspect="1"/>
+          </p:cNvSpPr>
+          <p:nvPr>
+            <p:ph type="sldImg" idx="2"/>
+          </p:nvPr>
+        </p:nvSpPr>
+        <p:spPr>
+          <a:xfrm>
+            <a:off x="685800" y="1143000"/>
+            <a:ext cx="5486400" cy="3086100"/>
+          </a:xfrm>
+          <a:prstGeom prst="rect">
+            <a:avLst/>
+          </a:prstGeom>
+          <a:noFill/>
+          <a:ln w="12700">
+            <a:solidFill>
+              <a:prstClr val="black"/>
+            </a:solidFill>
+          </a:ln>
+        </p:spPr>
+        <p:txBody>
+          <a:bodyPr vert="horz" lIns="91440" tIns="45720" rIns="91440" bIns="45720" rtlCol="0" anchor="ctr"/>
+          <a:lstStyle/>
+          <a:p>
+            <a:endParaRPr lang="en-GB"/>
+          </a:p>
+        </p:txBody>
+      </p:sp>
+      <p:sp>
+        <p:nvSpPr>
+          <p:cNvPr id="5" name="Espace réservé des notes 4"/>
+          <p:cNvSpPr>
+            <a:spLocks noGrp="1"/>
+          </p:cNvSpPr>
+          <p:nvPr>
+            <p:ph type="body" sz="quarter" idx="3"/>
+          </p:nvPr>
+        </p:nvSpPr>
+        <p:spPr>
+          <a:xfrm>
+            <a:off x="685800" y="4400550"/>
+            <a:ext cx="5486400" cy="3600450"/>
+          </a:xfrm>
+          <a:prstGeom prst="rect">
+            <a:avLst/>
+          </a:prstGeom>
+        </p:spPr>
+        <p:txBody>
+          <a:bodyPr vert="horz" lIns="91440" tIns="45720" rIns="91440" bIns="45720" rtlCol="0"/>
+          <a:lstStyle/>
+          <a:p>
+            <a:pPr lvl="0"/>
+            <a:r>
+              <a:rPr lang="fr-FR"/>
+              <a:t>Cliquez pour modifier les styles du texte du masque</a:t>
+            </a:r>
+          </a:p>
+          <a:p>
+            <a:pPr lvl="1"/>
+            <a:r>
+              <a:rPr lang="fr-FR"/>
+              <a:t>Deuxième niveau</a:t>
+            </a:r>
+          </a:p>
+          <a:p>
+            <a:pPr lvl="2"/>
+            <a:r>
+              <a:rPr lang="fr-FR"/>
+              <a:t>Troisième niveau</a:t>
+            </a:r>
+          </a:p>
+          <a:p>
+            <a:pPr lvl="3"/>
+            <a:r>
+              <a:rPr lang="fr-FR"/>
+              <a:t>Quatrième niveau</a:t>
+            </a:r>
+          </a:p>
+          <a:p>
+            <a:pPr lvl="4"/>
+            <a:r>
+              <a:rPr lang="fr-FR"/>
+              <a:t>Cinquième niveau</a:t>
+            </a:r>
+            <a:endParaRPr lang="en-GB"/>
+          </a:p>
+        </p:txBody>
+      </p:sp>
+      <p:sp>
+        <p:nvSpPr>
+          <p:cNvPr id="6" name="Espace réservé du pied de page 5"/>
+          <p:cNvSpPr>
+            <a:spLocks noGrp="1"/>
+          </p:cNvSpPr>
+          <p:nvPr>
+            <p:ph type="ftr" sz="quarter" idx="4"/>
+          </p:nvPr>
+        </p:nvSpPr>
+        <p:spPr>
+          <a:xfrm>
+            <a:off x="0" y="8685213"/>
+            <a:ext cx="2971800" cy="458787"/>
+          </a:xfrm>
+          <a:prstGeom prst="rect">
+            <a:avLst/>
+          </a:prstGeom>
+        </p:spPr>
+        <p:txBody>
+          <a:bodyPr vert="horz" lIns="91440" tIns="45720" rIns="91440" bIns="45720" rtlCol="0" anchor="b"/>
+          <a:lstStyle>
+            <a:lvl1pPr algn="l">
+              <a:defRPr sz="1200"/>
+            </a:lvl1pPr>
+          </a:lstStyle>
+          <a:p>
+            <a:endParaRPr lang="en-GB"/>
+          </a:p>
+        </p:txBody>
+      </p:sp>
+      <p:sp>
+        <p:nvSpPr>
+          <p:cNvPr id="7" name="Espace réservé du numéro de diapositive 6"/>
+          <p:cNvSpPr>
+            <a:spLocks noGrp="1"/>
+          </p:cNvSpPr>
+          <p:nvPr>
+            <p:ph type="sldNum" sz="quarter" idx="5"/>
+          </p:nvPr>
+        </p:nvSpPr>
+        <p:spPr>
+          <a:xfrm>
+            <a:off x="3884613" y="8685213"/>
+            <a:ext cx="2971800" cy="458787"/>
+          </a:xfrm>
+          <a:prstGeom prst="rect">
+            <a:avLst/>
+          </a:prstGeom>
+        </p:spPr>
+        <p:txBody>
+          <a:bodyPr vert="horz" lIns="91440" tIns="45720" rIns="91440" bIns="45720" rtlCol="0" anchor="b"/>
+          <a:lstStyle>
+            <a:lvl1pPr algn="r">
+              <a:defRPr sz="1200"/>
+            </a:lvl1pPr>
+          </a:lstStyle>
+          <a:p>
+            <a:fld id="{1B53981D-5C0D-4CFE-94CA-015F2E8A5858}" type="slidenum">
+              <a:rPr lang="en-GB" smtClean="0"/>
+              <a:t>‹N°›</a:t>
+            </a:fld>
+            <a:endParaRPr lang="en-GB"/>
+          </a:p>
+        </p:txBody>
+      </p:sp>
+    </p:spTree>
+    <p:extLst>
+      <p:ext uri="{BB962C8B-B14F-4D97-AF65-F5344CB8AC3E}">
+        <p14:creationId xmlns:p14="http://schemas.microsoft.com/office/powerpoint/2010/main" val="3168503490"/>
+      </p:ext>
+    </p:extLst>
+  </p:cSld>
+  <p:clrMap bg1="lt1" tx1="dk1" bg2="lt2" tx2="dk2" accent1="accent1" accent2="accent2" accent3="accent3" accent4="accent4" accent5="accent5" accent6="accent6" hlink="hlink" folHlink="folHlink"/>
+  <p:notesStyle>
+    <a:lvl1pPr marL="0" algn="l" defTabSz="914400" rtl="0" eaLnBrk="1" latinLnBrk="0" hangingPunct="1">
+      <a:defRPr sz="1200" kern="1200">
+        <a:solidFill>
+          <a:schemeClr val="tx1"/>
+        </a:solidFill>
+        <a:latin typeface="+mn-lt"/>
+        <a:ea typeface="+mn-ea"/>
+        <a:cs typeface="+mn-cs"/>
+      </a:defRPr>
+    </a:lvl1pPr>
+    <a:lvl2pPr marL="457200" algn="l" defTabSz="914400" rtl="0" eaLnBrk="1" latinLnBrk="0" hangingPunct="1">
+      <a:defRPr sz="1200" kern="1200">
+        <a:solidFill>
+          <a:schemeClr val="tx1"/>
+        </a:solidFill>
+        <a:latin typeface="+mn-lt"/>
+        <a:ea typeface="+mn-ea"/>
+        <a:cs typeface="+mn-cs"/>
+      </a:defRPr>
+    </a:lvl2pPr>
+    <a:lvl3pPr marL="914400" algn="l" defTabSz="914400" rtl="0" eaLnBrk="1" latinLnBrk="0" hangingPunct="1">
+      <a:defRPr sz="1200" kern="1200">
+        <a:solidFill>
+          <a:schemeClr val="tx1"/>
+        </a:solidFill>
+        <a:latin typeface="+mn-lt"/>
+        <a:ea typeface="+mn-ea"/>
+        <a:cs typeface="+mn-cs"/>
+      </a:defRPr>
+    </a:lvl3pPr>
+    <a:lvl4pPr marL="1371600" algn="l" defTabSz="914400" rtl="0" eaLnBrk="1" latinLnBrk="0" hangingPunct="1">
+      <a:defRPr sz="1200" kern="1200">
+        <a:solidFill>
+          <a:schemeClr val="tx1"/>
+        </a:solidFill>
+        <a:latin typeface="+mn-lt"/>
+        <a:ea typeface="+mn-ea"/>
+        <a:cs typeface="+mn-cs"/>
+      </a:defRPr>
+    </a:lvl4pPr>
+    <a:lvl5pPr marL="1828800" algn="l" defTabSz="914400" rtl="0" eaLnBrk="1" latinLnBrk="0" hangingPunct="1">
+      <a:defRPr sz="1200" kern="1200">
+        <a:solidFill>
+          <a:schemeClr val="tx1"/>
+        </a:solidFill>
+        <a:latin typeface="+mn-lt"/>
+        <a:ea typeface="+mn-ea"/>
+        <a:cs typeface="+mn-cs"/>
+      </a:defRPr>
+    </a:lvl5pPr>
+    <a:lvl6pPr marL="2286000" algn="l" defTabSz="914400" rtl="0" eaLnBrk="1" latinLnBrk="0" hangingPunct="1">
+      <a:defRPr sz="1200" kern="1200">
+        <a:solidFill>
+          <a:schemeClr val="tx1"/>
+        </a:solidFill>
+        <a:latin typeface="+mn-lt"/>
+        <a:ea typeface="+mn-ea"/>
+        <a:cs typeface="+mn-cs"/>
+      </a:defRPr>
+    </a:lvl6pPr>
+    <a:lvl7pPr marL="2743200" algn="l" defTabSz="914400" rtl="0" eaLnBrk="1" latinLnBrk="0" hangingPunct="1">
+      <a:defRPr sz="1200" kern="1200">
+        <a:solidFill>
+          <a:schemeClr val="tx1"/>
+        </a:solidFill>
+        <a:latin typeface="+mn-lt"/>
+        <a:ea typeface="+mn-ea"/>
+        <a:cs typeface="+mn-cs"/>
+      </a:defRPr>
+    </a:lvl7pPr>
+    <a:lvl8pPr marL="3200400" algn="l" defTabSz="914400" rtl="0" eaLnBrk="1" latinLnBrk="0" hangingPunct="1">
+      <a:defRPr sz="1200" kern="1200">
+        <a:solidFill>
+          <a:schemeClr val="tx1"/>
+        </a:solidFill>
+        <a:latin typeface="+mn-lt"/>
+        <a:ea typeface="+mn-ea"/>
+        <a:cs typeface="+mn-cs"/>
+      </a:defRPr>
+    </a:lvl8pPr>
+    <a:lvl9pPr marL="3657600" algn="l" defTabSz="914400" rtl="0" eaLnBrk="1" latinLnBrk="0" hangingPunct="1">
+      <a:defRPr sz="1200" kern="1200">
+        <a:solidFill>
+          <a:schemeClr val="tx1"/>
+        </a:solidFill>
+        <a:latin typeface="+mn-lt"/>
+        <a:ea typeface="+mn-ea"/>
+        <a:cs typeface="+mn-cs"/>
+      </a:defRPr>
+    </a:lvl9pPr>
+  </p:notesStyle>
+</p:notesMaster>
+</file>
+
+<file path=ppt/notesSlides/notesSlide1.xml><?xml version="1.0" encoding="utf-8"?>
+<p:notes xmlns:a="http://schemas.openxmlformats.org/drawingml/2006/main" xmlns:r="http://schemas.openxmlformats.org/officeDocument/2006/relationships" xmlns:p="http://schemas.openxmlformats.org/presentationml/2006/main">
+  <p:cSld>
+    <p:spTree>
+      <p:nvGrpSpPr>
+        <p:cNvPr id="1" name=""/>
+        <p:cNvGrpSpPr/>
+        <p:nvPr/>
+      </p:nvGrpSpPr>
+      <p:grpSpPr>
+        <a:xfrm>
+          <a:off x="0" y="0"/>
+          <a:ext cx="0" cy="0"/>
+          <a:chOff x="0" y="0"/>
+          <a:chExt cx="0" cy="0"/>
+        </a:xfrm>
+      </p:grpSpPr>
+      <p:sp>
+        <p:nvSpPr>
+          <p:cNvPr id="2" name="Espace réservé de l'image des diapositives 1"/>
+          <p:cNvSpPr>
+            <a:spLocks noGrp="1" noRot="1" noChangeAspect="1"/>
+          </p:cNvSpPr>
+          <p:nvPr>
+            <p:ph type="sldImg"/>
+          </p:nvPr>
+        </p:nvSpPr>
+        <p:spPr/>
+      </p:sp>
+      <p:sp>
+        <p:nvSpPr>
+          <p:cNvPr id="3" name="Espace réservé des notes 2"/>
+          <p:cNvSpPr>
+            <a:spLocks noGrp="1"/>
+          </p:cNvSpPr>
+          <p:nvPr>
+            <p:ph type="body" idx="1"/>
+          </p:nvPr>
+        </p:nvSpPr>
+        <p:spPr/>
+        <p:txBody>
+          <a:bodyPr/>
+          <a:lstStyle/>
+          <a:p>
+            <a:r>
+              <a:rPr lang="fr-BE" dirty="0"/>
+              <a:t>Dans un même package</a:t>
+            </a:r>
+            <a:br>
+              <a:rPr lang="fr-BE" dirty="0"/>
+            </a:br>
+            <a:r>
+              <a:rPr lang="fr-BE" dirty="0"/>
+              <a:t>Toujours une fonction</a:t>
+            </a:r>
+            <a:br>
+              <a:rPr lang="fr-BE" dirty="0"/>
+            </a:br>
+            <a:r>
+              <a:rPr lang="fr-BE" dirty="0"/>
+              <a:t>S’applique sur une structure</a:t>
+            </a:r>
+            <a:endParaRPr lang="en-GB" dirty="0"/>
+          </a:p>
+        </p:txBody>
+      </p:sp>
+      <p:sp>
+        <p:nvSpPr>
+          <p:cNvPr id="4" name="Espace réservé du numéro de diapositive 3"/>
+          <p:cNvSpPr>
+            <a:spLocks noGrp="1"/>
+          </p:cNvSpPr>
+          <p:nvPr>
+            <p:ph type="sldNum" sz="quarter" idx="5"/>
+          </p:nvPr>
+        </p:nvSpPr>
+        <p:spPr/>
+        <p:txBody>
+          <a:bodyPr/>
+          <a:lstStyle/>
+          <a:p>
+            <a:fld id="{1B53981D-5C0D-4CFE-94CA-015F2E8A5858}" type="slidenum">
+              <a:rPr lang="en-GB" smtClean="0"/>
+              <a:t>8</a:t>
+            </a:fld>
+            <a:endParaRPr lang="en-GB"/>
+          </a:p>
+        </p:txBody>
+      </p:sp>
+    </p:spTree>
+    <p:extLst>
+      <p:ext uri="{BB962C8B-B14F-4D97-AF65-F5344CB8AC3E}">
+        <p14:creationId xmlns:p14="http://schemas.microsoft.com/office/powerpoint/2010/main" val="2120080159"/>
+      </p:ext>
+    </p:extLst>
+  </p:cSld>
+  <p:clrMapOvr>
+    <a:masterClrMapping/>
+  </p:clrMapOvr>
+</p:notes>
 </file>
 
 <file path=ppt/slideLayouts/slideLayout1.xml><?xml version="1.0" encoding="utf-8"?>
@@ -846,7 +1304,7 @@
           <a:p>
             <a:fld id="{C0C4FB13-012F-4037-81DA-501F3326904A}" type="datetimeFigureOut">
               <a:rPr lang="en-GB" smtClean="0"/>
-              <a:t>06/11/2019</a:t>
+              <a:t>07/11/2019</a:t>
             </a:fld>
             <a:endParaRPr lang="en-GB"/>
           </a:p>
@@ -1097,7 +1555,7 @@
           <a:p>
             <a:fld id="{C0C4FB13-012F-4037-81DA-501F3326904A}" type="datetimeFigureOut">
               <a:rPr lang="en-GB" smtClean="0"/>
-              <a:t>06/11/2019</a:t>
+              <a:t>07/11/2019</a:t>
             </a:fld>
             <a:endParaRPr lang="en-GB"/>
           </a:p>
@@ -1411,7 +1869,7 @@
           <a:p>
             <a:fld id="{C0C4FB13-012F-4037-81DA-501F3326904A}" type="datetimeFigureOut">
               <a:rPr lang="en-GB" smtClean="0"/>
-              <a:t>06/11/2019</a:t>
+              <a:t>07/11/2019</a:t>
             </a:fld>
             <a:endParaRPr lang="en-GB"/>
           </a:p>
@@ -1752,7 +2210,7 @@
           <a:p>
             <a:fld id="{C0C4FB13-012F-4037-81DA-501F3326904A}" type="datetimeFigureOut">
               <a:rPr lang="en-GB" smtClean="0"/>
-              <a:t>06/11/2019</a:t>
+              <a:t>07/11/2019</a:t>
             </a:fld>
             <a:endParaRPr lang="en-GB"/>
           </a:p>
@@ -2066,7 +2524,7 @@
           <a:p>
             <a:fld id="{C0C4FB13-012F-4037-81DA-501F3326904A}" type="datetimeFigureOut">
               <a:rPr lang="en-GB" smtClean="0"/>
-              <a:t>06/11/2019</a:t>
+              <a:t>07/11/2019</a:t>
             </a:fld>
             <a:endParaRPr lang="en-GB"/>
           </a:p>
@@ -2459,7 +2917,7 @@
           <a:p>
             <a:fld id="{C0C4FB13-012F-4037-81DA-501F3326904A}" type="datetimeFigureOut">
               <a:rPr lang="en-GB" smtClean="0"/>
-              <a:t>06/11/2019</a:t>
+              <a:t>07/11/2019</a:t>
             </a:fld>
             <a:endParaRPr lang="en-GB"/>
           </a:p>
@@ -2629,7 +3087,7 @@
           <a:p>
             <a:fld id="{C0C4FB13-012F-4037-81DA-501F3326904A}" type="datetimeFigureOut">
               <a:rPr lang="en-GB" smtClean="0"/>
-              <a:t>06/11/2019</a:t>
+              <a:t>07/11/2019</a:t>
             </a:fld>
             <a:endParaRPr lang="en-GB"/>
           </a:p>
@@ -2809,7 +3267,7 @@
           <a:p>
             <a:fld id="{C0C4FB13-012F-4037-81DA-501F3326904A}" type="datetimeFigureOut">
               <a:rPr lang="en-GB" smtClean="0"/>
-              <a:t>06/11/2019</a:t>
+              <a:t>07/11/2019</a:t>
             </a:fld>
             <a:endParaRPr lang="en-GB"/>
           </a:p>
@@ -2985,7 +3443,7 @@
           <a:p>
             <a:fld id="{C0C4FB13-012F-4037-81DA-501F3326904A}" type="datetimeFigureOut">
               <a:rPr lang="en-GB" smtClean="0"/>
-              <a:t>06/11/2019</a:t>
+              <a:t>07/11/2019</a:t>
             </a:fld>
             <a:endParaRPr lang="en-GB"/>
           </a:p>
@@ -3232,7 +3690,7 @@
           <a:p>
             <a:fld id="{C0C4FB13-012F-4037-81DA-501F3326904A}" type="datetimeFigureOut">
               <a:rPr lang="en-GB" smtClean="0"/>
-              <a:t>06/11/2019</a:t>
+              <a:t>07/11/2019</a:t>
             </a:fld>
             <a:endParaRPr lang="en-GB"/>
           </a:p>
@@ -3464,7 +3922,7 @@
           <a:p>
             <a:fld id="{C0C4FB13-012F-4037-81DA-501F3326904A}" type="datetimeFigureOut">
               <a:rPr lang="en-GB" smtClean="0"/>
-              <a:t>06/11/2019</a:t>
+              <a:t>07/11/2019</a:t>
             </a:fld>
             <a:endParaRPr lang="en-GB"/>
           </a:p>
@@ -3838,7 +4296,7 @@
           <a:p>
             <a:fld id="{C0C4FB13-012F-4037-81DA-501F3326904A}" type="datetimeFigureOut">
               <a:rPr lang="en-GB" smtClean="0"/>
-              <a:t>06/11/2019</a:t>
+              <a:t>07/11/2019</a:t>
             </a:fld>
             <a:endParaRPr lang="en-GB"/>
           </a:p>
@@ -3961,7 +4419,7 @@
           <a:p>
             <a:fld id="{C0C4FB13-012F-4037-81DA-501F3326904A}" type="datetimeFigureOut">
               <a:rPr lang="en-GB" smtClean="0"/>
-              <a:t>06/11/2019</a:t>
+              <a:t>07/11/2019</a:t>
             </a:fld>
             <a:endParaRPr lang="en-GB"/>
           </a:p>
@@ -4056,7 +4514,7 @@
           <a:p>
             <a:fld id="{C0C4FB13-012F-4037-81DA-501F3326904A}" type="datetimeFigureOut">
               <a:rPr lang="en-GB" smtClean="0"/>
-              <a:t>06/11/2019</a:t>
+              <a:t>07/11/2019</a:t>
             </a:fld>
             <a:endParaRPr lang="en-GB"/>
           </a:p>
@@ -4311,7 +4769,7 @@
           <a:p>
             <a:fld id="{C0C4FB13-012F-4037-81DA-501F3326904A}" type="datetimeFigureOut">
               <a:rPr lang="en-GB" smtClean="0"/>
-              <a:t>06/11/2019</a:t>
+              <a:t>07/11/2019</a:t>
             </a:fld>
             <a:endParaRPr lang="en-GB"/>
           </a:p>
@@ -4574,7 +5032,7 @@
           <a:p>
             <a:fld id="{C0C4FB13-012F-4037-81DA-501F3326904A}" type="datetimeFigureOut">
               <a:rPr lang="en-GB" smtClean="0"/>
-              <a:t>06/11/2019</a:t>
+              <a:t>07/11/2019</a:t>
             </a:fld>
             <a:endParaRPr lang="en-GB"/>
           </a:p>
@@ -5317,7 +5775,7 @@
           <a:p>
             <a:fld id="{C0C4FB13-012F-4037-81DA-501F3326904A}" type="datetimeFigureOut">
               <a:rPr lang="en-GB" smtClean="0"/>
-              <a:t>06/11/2019</a:t>
+              <a:t>07/11/2019</a:t>
             </a:fld>
             <a:endParaRPr lang="en-GB"/>
           </a:p>
@@ -5934,7 +6392,7 @@
           <p:cNvPr id="2" name="Titre 1">
             <a:extLst>
               <a:ext uri="{FF2B5EF4-FFF2-40B4-BE49-F238E27FC236}">
-                <a16:creationId xmlns:a16="http://schemas.microsoft.com/office/drawing/2014/main" id="{66EBE6C8-9DB4-4E67-B346-558031BB06E7}"/>
+                <a16:creationId xmlns:a16="http://schemas.microsoft.com/office/drawing/2014/main" id="{C82C0521-665E-4580-A0F9-73357D4CC4CC}"/>
               </a:ext>
             </a:extLst>
           </p:cNvPr>
@@ -5951,8 +6409,16 @@
           <a:lstStyle/>
           <a:p>
             <a:r>
+              <a:rPr lang="fr-BE" dirty="0" err="1"/>
+              <a:t>Prove</a:t>
+            </a:r>
+            <a:r>
               <a:rPr lang="fr-BE" dirty="0"/>
-              <a:t>L’héritage technique</a:t>
+              <a:t> </a:t>
+            </a:r>
+            <a:r>
+              <a:rPr lang="fr-BE" dirty="0" err="1"/>
+              <a:t>it</a:t>
             </a:r>
             <a:endParaRPr lang="en-GB" dirty="0"/>
           </a:p>
@@ -5963,7 +6429,7 @@
           <p:cNvPr id="3" name="Espace réservé du contenu 2">
             <a:extLst>
               <a:ext uri="{FF2B5EF4-FFF2-40B4-BE49-F238E27FC236}">
-                <a16:creationId xmlns:a16="http://schemas.microsoft.com/office/drawing/2014/main" id="{BB2066F6-54E7-4135-BB5E-C4FD1F8FDFB9}"/>
+                <a16:creationId xmlns:a16="http://schemas.microsoft.com/office/drawing/2014/main" id="{144003CA-C192-4E96-8ABF-E58C94E6A9A2}"/>
               </a:ext>
             </a:extLst>
           </p:cNvPr>
@@ -5979,14 +6445,44 @@
           <a:bodyPr/>
           <a:lstStyle/>
           <a:p>
-            <a:endParaRPr lang="en-GB"/>
-          </a:p>
-        </p:txBody>
-      </p:sp>
+            <a:endParaRPr lang="en-GB" dirty="0"/>
+          </a:p>
+        </p:txBody>
+      </p:sp>
+      <p:pic>
+        <p:nvPicPr>
+          <p:cNvPr id="6" name="Image 5">
+            <a:extLst>
+              <a:ext uri="{FF2B5EF4-FFF2-40B4-BE49-F238E27FC236}">
+                <a16:creationId xmlns:a16="http://schemas.microsoft.com/office/drawing/2014/main" id="{E1AF9BFA-65A1-4181-BFB0-452F4CA24B4D}"/>
+              </a:ext>
+            </a:extLst>
+          </p:cNvPr>
+          <p:cNvPicPr>
+            <a:picLocks noChangeAspect="1"/>
+          </p:cNvPicPr>
+          <p:nvPr/>
+        </p:nvPicPr>
+        <p:blipFill>
+          <a:blip r:embed="rId2"/>
+          <a:stretch>
+            <a:fillRect/>
+          </a:stretch>
+        </p:blipFill>
+        <p:spPr>
+          <a:xfrm>
+            <a:off x="898402" y="1595153"/>
+            <a:ext cx="8534774" cy="3934790"/>
+          </a:xfrm>
+          <a:prstGeom prst="rect">
+            <a:avLst/>
+          </a:prstGeom>
+        </p:spPr>
+      </p:pic>
     </p:spTree>
     <p:extLst>
       <p:ext uri="{BB962C8B-B14F-4D97-AF65-F5344CB8AC3E}">
-        <p14:creationId xmlns:p14="http://schemas.microsoft.com/office/powerpoint/2010/main" val="2669434403"/>
+        <p14:creationId xmlns:p14="http://schemas.microsoft.com/office/powerpoint/2010/main" val="1424394042"/>
       </p:ext>
     </p:extLst>
   </p:cSld>
@@ -6018,7 +6514,7 @@
           <p:cNvPr id="2" name="Titre 1">
             <a:extLst>
               <a:ext uri="{FF2B5EF4-FFF2-40B4-BE49-F238E27FC236}">
-                <a16:creationId xmlns:a16="http://schemas.microsoft.com/office/drawing/2014/main" id="{4ABD6729-ABA2-4010-8B86-1533EC7DA94B}"/>
+                <a16:creationId xmlns:a16="http://schemas.microsoft.com/office/drawing/2014/main" id="{3314784D-93FF-4F82-BD30-D98E7B615DC2}"/>
               </a:ext>
             </a:extLst>
           </p:cNvPr>
@@ -6036,7 +6532,7 @@
           <a:p>
             <a:r>
               <a:rPr lang="fr-BE" dirty="0"/>
-              <a:t>L’héritage polymorphique</a:t>
+              <a:t>Interfaces</a:t>
             </a:r>
             <a:endParaRPr lang="en-GB" dirty="0"/>
           </a:p>
@@ -6047,7 +6543,7 @@
           <p:cNvPr id="3" name="Espace réservé du contenu 2">
             <a:extLst>
               <a:ext uri="{FF2B5EF4-FFF2-40B4-BE49-F238E27FC236}">
-                <a16:creationId xmlns:a16="http://schemas.microsoft.com/office/drawing/2014/main" id="{C9E3E511-720F-4FAC-9D46-A1F45F57DCF2}"/>
+                <a16:creationId xmlns:a16="http://schemas.microsoft.com/office/drawing/2014/main" id="{F22A988F-7192-44E1-A77C-168BCE84EB9E}"/>
               </a:ext>
             </a:extLst>
           </p:cNvPr>
@@ -6063,14 +6559,14 @@
           <a:bodyPr/>
           <a:lstStyle/>
           <a:p>
-            <a:endParaRPr lang="en-GB"/>
+            <a:endParaRPr lang="en-GB" dirty="0"/>
           </a:p>
         </p:txBody>
       </p:sp>
     </p:spTree>
     <p:extLst>
       <p:ext uri="{BB962C8B-B14F-4D97-AF65-F5344CB8AC3E}">
-        <p14:creationId xmlns:p14="http://schemas.microsoft.com/office/powerpoint/2010/main" val="1154800508"/>
+        <p14:creationId xmlns:p14="http://schemas.microsoft.com/office/powerpoint/2010/main" val="2760514093"/>
       </p:ext>
     </p:extLst>
   </p:cSld>
@@ -6102,6 +6598,258 @@
           <p:cNvPr id="2" name="Titre 1">
             <a:extLst>
               <a:ext uri="{FF2B5EF4-FFF2-40B4-BE49-F238E27FC236}">
+                <a16:creationId xmlns:a16="http://schemas.microsoft.com/office/drawing/2014/main" id="{9AF73BF0-0057-42CB-8970-ED1DD7B6ABCD}"/>
+              </a:ext>
+            </a:extLst>
+          </p:cNvPr>
+          <p:cNvSpPr>
+            <a:spLocks noGrp="1"/>
+          </p:cNvSpPr>
+          <p:nvPr>
+            <p:ph type="title"/>
+          </p:nvPr>
+        </p:nvSpPr>
+        <p:spPr/>
+        <p:txBody>
+          <a:bodyPr/>
+          <a:lstStyle/>
+          <a:p>
+            <a:r>
+              <a:rPr lang="fr-BE" dirty="0"/>
+              <a:t>Rappel principe fondamentaux de l’orienté objet</a:t>
+            </a:r>
+            <a:endParaRPr lang="en-GB" dirty="0"/>
+          </a:p>
+        </p:txBody>
+      </p:sp>
+      <p:sp>
+        <p:nvSpPr>
+          <p:cNvPr id="3" name="Espace réservé du contenu 2">
+            <a:extLst>
+              <a:ext uri="{FF2B5EF4-FFF2-40B4-BE49-F238E27FC236}">
+                <a16:creationId xmlns:a16="http://schemas.microsoft.com/office/drawing/2014/main" id="{232F5410-CC02-4A25-8206-87C63996CD31}"/>
+              </a:ext>
+            </a:extLst>
+          </p:cNvPr>
+          <p:cNvSpPr>
+            <a:spLocks noGrp="1"/>
+          </p:cNvSpPr>
+          <p:nvPr>
+            <p:ph idx="1"/>
+          </p:nvPr>
+        </p:nvSpPr>
+        <p:spPr/>
+        <p:txBody>
+          <a:bodyPr/>
+          <a:lstStyle/>
+          <a:p>
+            <a:endParaRPr lang="en-GB" dirty="0"/>
+          </a:p>
+        </p:txBody>
+      </p:sp>
+    </p:spTree>
+    <p:extLst>
+      <p:ext uri="{BB962C8B-B14F-4D97-AF65-F5344CB8AC3E}">
+        <p14:creationId xmlns:p14="http://schemas.microsoft.com/office/powerpoint/2010/main" val="2737349872"/>
+      </p:ext>
+    </p:extLst>
+  </p:cSld>
+  <p:clrMapOvr>
+    <a:masterClrMapping/>
+  </p:clrMapOvr>
+</p:sld>
+</file>
+
+<file path=ppt/slides/slide13.xml><?xml version="1.0" encoding="utf-8"?>
+<p:sld xmlns:a="http://schemas.openxmlformats.org/drawingml/2006/main" xmlns:r="http://schemas.openxmlformats.org/officeDocument/2006/relationships" xmlns:p="http://schemas.openxmlformats.org/presentationml/2006/main">
+  <p:cSld>
+    <p:spTree>
+      <p:nvGrpSpPr>
+        <p:cNvPr id="1" name=""/>
+        <p:cNvGrpSpPr/>
+        <p:nvPr/>
+      </p:nvGrpSpPr>
+      <p:grpSpPr>
+        <a:xfrm>
+          <a:off x="0" y="0"/>
+          <a:ext cx="0" cy="0"/>
+          <a:chOff x="0" y="0"/>
+          <a:chExt cx="0" cy="0"/>
+        </a:xfrm>
+      </p:grpSpPr>
+      <p:sp>
+        <p:nvSpPr>
+          <p:cNvPr id="2" name="Titre 1">
+            <a:extLst>
+              <a:ext uri="{FF2B5EF4-FFF2-40B4-BE49-F238E27FC236}">
+                <a16:creationId xmlns:a16="http://schemas.microsoft.com/office/drawing/2014/main" id="{66EBE6C8-9DB4-4E67-B346-558031BB06E7}"/>
+              </a:ext>
+            </a:extLst>
+          </p:cNvPr>
+          <p:cNvSpPr>
+            <a:spLocks noGrp="1"/>
+          </p:cNvSpPr>
+          <p:nvPr>
+            <p:ph type="title"/>
+          </p:nvPr>
+        </p:nvSpPr>
+        <p:spPr/>
+        <p:txBody>
+          <a:bodyPr/>
+          <a:lstStyle/>
+          <a:p>
+            <a:r>
+              <a:rPr lang="fr-BE" dirty="0"/>
+              <a:t>L’héritage technique</a:t>
+            </a:r>
+            <a:endParaRPr lang="en-GB" dirty="0"/>
+          </a:p>
+        </p:txBody>
+      </p:sp>
+      <p:sp>
+        <p:nvSpPr>
+          <p:cNvPr id="3" name="Espace réservé du contenu 2">
+            <a:extLst>
+              <a:ext uri="{FF2B5EF4-FFF2-40B4-BE49-F238E27FC236}">
+                <a16:creationId xmlns:a16="http://schemas.microsoft.com/office/drawing/2014/main" id="{BB2066F6-54E7-4135-BB5E-C4FD1F8FDFB9}"/>
+              </a:ext>
+            </a:extLst>
+          </p:cNvPr>
+          <p:cNvSpPr>
+            <a:spLocks noGrp="1"/>
+          </p:cNvSpPr>
+          <p:nvPr>
+            <p:ph idx="1"/>
+          </p:nvPr>
+        </p:nvSpPr>
+        <p:spPr/>
+        <p:txBody>
+          <a:bodyPr/>
+          <a:lstStyle/>
+          <a:p>
+            <a:endParaRPr lang="en-GB"/>
+          </a:p>
+        </p:txBody>
+      </p:sp>
+    </p:spTree>
+    <p:extLst>
+      <p:ext uri="{BB962C8B-B14F-4D97-AF65-F5344CB8AC3E}">
+        <p14:creationId xmlns:p14="http://schemas.microsoft.com/office/powerpoint/2010/main" val="2669434403"/>
+      </p:ext>
+    </p:extLst>
+  </p:cSld>
+  <p:clrMapOvr>
+    <a:masterClrMapping/>
+  </p:clrMapOvr>
+</p:sld>
+</file>
+
+<file path=ppt/slides/slide14.xml><?xml version="1.0" encoding="utf-8"?>
+<p:sld xmlns:a="http://schemas.openxmlformats.org/drawingml/2006/main" xmlns:r="http://schemas.openxmlformats.org/officeDocument/2006/relationships" xmlns:p="http://schemas.openxmlformats.org/presentationml/2006/main">
+  <p:cSld>
+    <p:spTree>
+      <p:nvGrpSpPr>
+        <p:cNvPr id="1" name=""/>
+        <p:cNvGrpSpPr/>
+        <p:nvPr/>
+      </p:nvGrpSpPr>
+      <p:grpSpPr>
+        <a:xfrm>
+          <a:off x="0" y="0"/>
+          <a:ext cx="0" cy="0"/>
+          <a:chOff x="0" y="0"/>
+          <a:chExt cx="0" cy="0"/>
+        </a:xfrm>
+      </p:grpSpPr>
+      <p:sp>
+        <p:nvSpPr>
+          <p:cNvPr id="2" name="Titre 1">
+            <a:extLst>
+              <a:ext uri="{FF2B5EF4-FFF2-40B4-BE49-F238E27FC236}">
+                <a16:creationId xmlns:a16="http://schemas.microsoft.com/office/drawing/2014/main" id="{4ABD6729-ABA2-4010-8B86-1533EC7DA94B}"/>
+              </a:ext>
+            </a:extLst>
+          </p:cNvPr>
+          <p:cNvSpPr>
+            <a:spLocks noGrp="1"/>
+          </p:cNvSpPr>
+          <p:nvPr>
+            <p:ph type="title"/>
+          </p:nvPr>
+        </p:nvSpPr>
+        <p:spPr/>
+        <p:txBody>
+          <a:bodyPr/>
+          <a:lstStyle/>
+          <a:p>
+            <a:r>
+              <a:rPr lang="fr-BE" dirty="0"/>
+              <a:t>L’héritage polymorphique</a:t>
+            </a:r>
+            <a:endParaRPr lang="en-GB" dirty="0"/>
+          </a:p>
+        </p:txBody>
+      </p:sp>
+      <p:sp>
+        <p:nvSpPr>
+          <p:cNvPr id="3" name="Espace réservé du contenu 2">
+            <a:extLst>
+              <a:ext uri="{FF2B5EF4-FFF2-40B4-BE49-F238E27FC236}">
+                <a16:creationId xmlns:a16="http://schemas.microsoft.com/office/drawing/2014/main" id="{C9E3E511-720F-4FAC-9D46-A1F45F57DCF2}"/>
+              </a:ext>
+            </a:extLst>
+          </p:cNvPr>
+          <p:cNvSpPr>
+            <a:spLocks noGrp="1"/>
+          </p:cNvSpPr>
+          <p:nvPr>
+            <p:ph idx="1"/>
+          </p:nvPr>
+        </p:nvSpPr>
+        <p:spPr/>
+        <p:txBody>
+          <a:bodyPr/>
+          <a:lstStyle/>
+          <a:p>
+            <a:endParaRPr lang="en-GB"/>
+          </a:p>
+        </p:txBody>
+      </p:sp>
+    </p:spTree>
+    <p:extLst>
+      <p:ext uri="{BB962C8B-B14F-4D97-AF65-F5344CB8AC3E}">
+        <p14:creationId xmlns:p14="http://schemas.microsoft.com/office/powerpoint/2010/main" val="1154800508"/>
+      </p:ext>
+    </p:extLst>
+  </p:cSld>
+  <p:clrMapOvr>
+    <a:masterClrMapping/>
+  </p:clrMapOvr>
+</p:sld>
+</file>
+
+<file path=ppt/slides/slide15.xml><?xml version="1.0" encoding="utf-8"?>
+<p:sld xmlns:a="http://schemas.openxmlformats.org/drawingml/2006/main" xmlns:r="http://schemas.openxmlformats.org/officeDocument/2006/relationships" xmlns:p="http://schemas.openxmlformats.org/presentationml/2006/main">
+  <p:cSld>
+    <p:spTree>
+      <p:nvGrpSpPr>
+        <p:cNvPr id="1" name=""/>
+        <p:cNvGrpSpPr/>
+        <p:nvPr/>
+      </p:nvGrpSpPr>
+      <p:grpSpPr>
+        <a:xfrm>
+          <a:off x="0" y="0"/>
+          <a:ext cx="0" cy="0"/>
+          <a:chOff x="0" y="0"/>
+          <a:chExt cx="0" cy="0"/>
+        </a:xfrm>
+      </p:grpSpPr>
+      <p:sp>
+        <p:nvSpPr>
+          <p:cNvPr id="2" name="Titre 1">
+            <a:extLst>
+              <a:ext uri="{FF2B5EF4-FFF2-40B4-BE49-F238E27FC236}">
                 <a16:creationId xmlns:a16="http://schemas.microsoft.com/office/drawing/2014/main" id="{80D7D2F9-5224-4FE9-A77B-1B3A763426CF}"/>
               </a:ext>
             </a:extLst>
@@ -6168,7 +6916,7 @@
 </p:sld>
 </file>
 
-<file path=ppt/slides/slide13.xml><?xml version="1.0" encoding="utf-8"?>
+<file path=ppt/slides/slide16.xml><?xml version="1.0" encoding="utf-8"?>
 <p:sld xmlns:a="http://schemas.openxmlformats.org/drawingml/2006/main" xmlns:r="http://schemas.openxmlformats.org/officeDocument/2006/relationships" xmlns:p="http://schemas.openxmlformats.org/presentationml/2006/main">
   <p:cSld>
     <p:spTree>
@@ -6581,7 +7329,7 @@
         </p:nvSpPr>
         <p:spPr>
           <a:xfrm>
-            <a:off x="4316346" y="3211443"/>
+            <a:off x="8384175" y="3577203"/>
             <a:ext cx="1779654" cy="2862322"/>
           </a:xfrm>
           <a:prstGeom prst="rect">
@@ -6616,6 +7364,54 @@
               <a:t> </a:t>
             </a:r>
             <a:endParaRPr lang="en-GB" dirty="0"/>
+          </a:p>
+        </p:txBody>
+      </p:sp>
+      <p:sp>
+        <p:nvSpPr>
+          <p:cNvPr id="3" name="ZoneTexte 2">
+            <a:extLst>
+              <a:ext uri="{FF2B5EF4-FFF2-40B4-BE49-F238E27FC236}">
+                <a16:creationId xmlns:a16="http://schemas.microsoft.com/office/drawing/2014/main" id="{0D94C875-E09D-40C8-9C02-EA936E40B1DA}"/>
+              </a:ext>
+            </a:extLst>
+          </p:cNvPr>
+          <p:cNvSpPr txBox="1"/>
+          <p:nvPr/>
+        </p:nvSpPr>
+        <p:spPr>
+          <a:xfrm>
+            <a:off x="798022" y="4127269"/>
+            <a:ext cx="5747086" cy="1015663"/>
+          </a:xfrm>
+          <a:prstGeom prst="rect">
+            <a:avLst/>
+          </a:prstGeom>
+          <a:noFill/>
+        </p:spPr>
+        <p:txBody>
+          <a:bodyPr wrap="none" rtlCol="0">
+            <a:spAutoFit/>
+          </a:bodyPr>
+          <a:lstStyle/>
+          <a:p>
+            <a:r>
+              <a:rPr lang="fr-BE" sz="6000" dirty="0">
+                <a:solidFill>
+                  <a:schemeClr val="accent1">
+                    <a:lumMod val="75000"/>
+                  </a:schemeClr>
+                </a:solidFill>
+              </a:rPr>
+              <a:t>variable:=type{}</a:t>
+            </a:r>
+            <a:endParaRPr lang="en-GB" sz="6000" dirty="0">
+              <a:solidFill>
+                <a:schemeClr val="accent1">
+                  <a:lumMod val="75000"/>
+                </a:schemeClr>
+              </a:solidFill>
+            </a:endParaRPr>
           </a:p>
         </p:txBody>
       </p:sp>
@@ -6938,7 +7734,12 @@
             <p:ph type="title"/>
           </p:nvPr>
         </p:nvSpPr>
-        <p:spPr/>
+        <p:spPr>
+          <a:xfrm>
+            <a:off x="677334" y="609600"/>
+            <a:ext cx="8596668" cy="1320800"/>
+          </a:xfrm>
+        </p:spPr>
         <p:txBody>
           <a:bodyPr/>
           <a:lstStyle/>
@@ -6947,38 +7748,75 @@
               <a:rPr lang="fr-BE" dirty="0"/>
               <a:t>Les méthode en Go</a:t>
             </a:r>
+            <a:br>
+              <a:rPr lang="fr-BE" dirty="0"/>
+            </a:br>
             <a:endParaRPr lang="en-GB" dirty="0"/>
           </a:p>
         </p:txBody>
       </p:sp>
-      <p:sp>
-        <p:nvSpPr>
-          <p:cNvPr id="3" name="Espace réservé du contenu 2">
+      <p:pic>
+        <p:nvPicPr>
+          <p:cNvPr id="4" name="Espace réservé du contenu 3">
             <a:extLst>
               <a:ext uri="{FF2B5EF4-FFF2-40B4-BE49-F238E27FC236}">
-                <a16:creationId xmlns:a16="http://schemas.microsoft.com/office/drawing/2014/main" id="{F27CE61F-A01C-4C71-A30B-C8BA1CF27FA2}"/>
+                <a16:creationId xmlns:a16="http://schemas.microsoft.com/office/drawing/2014/main" id="{83CDF6CA-9C99-4A80-AB32-F05170772B01}"/>
               </a:ext>
             </a:extLst>
           </p:cNvPr>
-          <p:cNvSpPr>
-            <a:spLocks noGrp="1"/>
-          </p:cNvSpPr>
+          <p:cNvPicPr>
+            <a:picLocks noGrp="1" noChangeAspect="1"/>
+          </p:cNvPicPr>
           <p:nvPr>
             <p:ph idx="1"/>
           </p:nvPr>
-        </p:nvSpPr>
-        <p:spPr/>
-        <p:txBody>
-          <a:bodyPr/>
-          <a:lstStyle/>
-          <a:p>
-            <a:pPr marL="0" indent="0">
-              <a:buNone/>
-            </a:pPr>
-            <a:endParaRPr lang="en-GB" dirty="0"/>
-          </a:p>
-        </p:txBody>
-      </p:sp>
+        </p:nvPicPr>
+        <p:blipFill>
+          <a:blip r:embed="rId2"/>
+          <a:stretch>
+            <a:fillRect/>
+          </a:stretch>
+        </p:blipFill>
+        <p:spPr>
+          <a:xfrm>
+            <a:off x="472286" y="1196156"/>
+            <a:ext cx="6438361" cy="3731445"/>
+          </a:xfrm>
+          <a:prstGeom prst="rect">
+            <a:avLst/>
+          </a:prstGeom>
+        </p:spPr>
+      </p:pic>
+      <p:pic>
+        <p:nvPicPr>
+          <p:cNvPr id="5" name="Image 4">
+            <a:extLst>
+              <a:ext uri="{FF2B5EF4-FFF2-40B4-BE49-F238E27FC236}">
+                <a16:creationId xmlns:a16="http://schemas.microsoft.com/office/drawing/2014/main" id="{19C79809-F084-4E6D-9B37-891A3CF2BE4D}"/>
+              </a:ext>
+            </a:extLst>
+          </p:cNvPr>
+          <p:cNvPicPr>
+            <a:picLocks noChangeAspect="1"/>
+          </p:cNvPicPr>
+          <p:nvPr/>
+        </p:nvPicPr>
+        <p:blipFill>
+          <a:blip r:embed="rId3"/>
+          <a:stretch>
+            <a:fillRect/>
+          </a:stretch>
+        </p:blipFill>
+        <p:spPr>
+          <a:xfrm>
+            <a:off x="2788739" y="5064803"/>
+            <a:ext cx="8243816" cy="1594909"/>
+          </a:xfrm>
+          <a:prstGeom prst="rect">
+            <a:avLst/>
+          </a:prstGeom>
+        </p:spPr>
+      </p:pic>
     </p:spTree>
     <p:extLst>
       <p:ext uri="{BB962C8B-B14F-4D97-AF65-F5344CB8AC3E}">
@@ -7014,7 +7852,7 @@
           <p:cNvPr id="2" name="Titre 1">
             <a:extLst>
               <a:ext uri="{FF2B5EF4-FFF2-40B4-BE49-F238E27FC236}">
-                <a16:creationId xmlns:a16="http://schemas.microsoft.com/office/drawing/2014/main" id="{3314784D-93FF-4F82-BD30-D98E7B615DC2}"/>
+                <a16:creationId xmlns:a16="http://schemas.microsoft.com/office/drawing/2014/main" id="{63342A71-14ED-4937-8400-6818ED0D033C}"/>
               </a:ext>
             </a:extLst>
           </p:cNvPr>
@@ -7032,41 +7870,84 @@
           <a:p>
             <a:r>
               <a:rPr lang="fr-BE" dirty="0"/>
-              <a:t>Interfaces</a:t>
+              <a:t>Découpage d’une méthode</a:t>
             </a:r>
             <a:endParaRPr lang="en-GB" dirty="0"/>
           </a:p>
         </p:txBody>
       </p:sp>
-      <p:sp>
-        <p:nvSpPr>
-          <p:cNvPr id="3" name="Espace réservé du contenu 2">
+      <p:pic>
+        <p:nvPicPr>
+          <p:cNvPr id="4" name="Espace réservé du contenu 3">
             <a:extLst>
               <a:ext uri="{FF2B5EF4-FFF2-40B4-BE49-F238E27FC236}">
-                <a16:creationId xmlns:a16="http://schemas.microsoft.com/office/drawing/2014/main" id="{F22A988F-7192-44E1-A77C-168BCE84EB9E}"/>
+                <a16:creationId xmlns:a16="http://schemas.microsoft.com/office/drawing/2014/main" id="{EEA05357-D5F2-4DDF-BBB8-044368256437}"/>
               </a:ext>
             </a:extLst>
           </p:cNvPr>
-          <p:cNvSpPr>
-            <a:spLocks noGrp="1"/>
-          </p:cNvSpPr>
+          <p:cNvPicPr>
+            <a:picLocks noGrp="1" noChangeAspect="1"/>
+          </p:cNvPicPr>
           <p:nvPr>
             <p:ph idx="1"/>
           </p:nvPr>
-        </p:nvSpPr>
-        <p:spPr/>
-        <p:txBody>
-          <a:bodyPr/>
-          <a:lstStyle/>
-          <a:p>
-            <a:endParaRPr lang="en-GB" dirty="0"/>
+        </p:nvPicPr>
+        <p:blipFill>
+          <a:blip r:embed="rId3"/>
+          <a:stretch>
+            <a:fillRect/>
+          </a:stretch>
+        </p:blipFill>
+        <p:spPr>
+          <a:xfrm>
+            <a:off x="677334" y="1587817"/>
+            <a:ext cx="7895168" cy="4660583"/>
+          </a:xfrm>
+          <a:prstGeom prst="rect">
+            <a:avLst/>
+          </a:prstGeom>
+        </p:spPr>
+      </p:pic>
+      <p:sp>
+        <p:nvSpPr>
+          <p:cNvPr id="5" name="ZoneTexte 4">
+            <a:extLst>
+              <a:ext uri="{FF2B5EF4-FFF2-40B4-BE49-F238E27FC236}">
+                <a16:creationId xmlns:a16="http://schemas.microsoft.com/office/drawing/2014/main" id="{C6273E89-7844-43FA-80AE-5DCBE1EE75E1}"/>
+              </a:ext>
+            </a:extLst>
+          </p:cNvPr>
+          <p:cNvSpPr txBox="1"/>
+          <p:nvPr/>
+        </p:nvSpPr>
+        <p:spPr>
+          <a:xfrm>
+            <a:off x="8678487" y="3704679"/>
+            <a:ext cx="3067396" cy="769441"/>
+          </a:xfrm>
+          <a:prstGeom prst="rect">
+            <a:avLst/>
+          </a:prstGeom>
+          <a:noFill/>
+        </p:spPr>
+        <p:txBody>
+          <a:bodyPr wrap="square" rtlCol="0">
+            <a:spAutoFit/>
+          </a:bodyPr>
+          <a:lstStyle/>
+          <a:p>
+            <a:r>
+              <a:rPr lang="fr-BE" sz="4400" dirty="0"/>
+              <a:t>This ?</a:t>
+            </a:r>
+            <a:endParaRPr lang="en-GB" sz="4400" dirty="0"/>
           </a:p>
         </p:txBody>
       </p:sp>
     </p:spTree>
     <p:extLst>
       <p:ext uri="{BB962C8B-B14F-4D97-AF65-F5344CB8AC3E}">
-        <p14:creationId xmlns:p14="http://schemas.microsoft.com/office/powerpoint/2010/main" val="2760514093"/>
+        <p14:creationId xmlns:p14="http://schemas.microsoft.com/office/powerpoint/2010/main" val="2304951179"/>
       </p:ext>
     </p:extLst>
   </p:cSld>
@@ -7098,7 +7979,7 @@
           <p:cNvPr id="2" name="Titre 1">
             <a:extLst>
               <a:ext uri="{FF2B5EF4-FFF2-40B4-BE49-F238E27FC236}">
-                <a16:creationId xmlns:a16="http://schemas.microsoft.com/office/drawing/2014/main" id="{9AF73BF0-0057-42CB-8970-ED1DD7B6ABCD}"/>
+                <a16:creationId xmlns:a16="http://schemas.microsoft.com/office/drawing/2014/main" id="{FDD70546-85BC-4A8E-A036-15C97D2371E2}"/>
               </a:ext>
             </a:extLst>
           </p:cNvPr>
@@ -7116,41 +7997,48 @@
           <a:p>
             <a:r>
               <a:rPr lang="fr-BE" dirty="0"/>
-              <a:t>Rappel principe fondamentaux de l’orienté objet</a:t>
+              <a:t>Les méthodes sur un pointer</a:t>
             </a:r>
             <a:endParaRPr lang="en-GB" dirty="0"/>
           </a:p>
         </p:txBody>
       </p:sp>
-      <p:sp>
-        <p:nvSpPr>
-          <p:cNvPr id="3" name="Espace réservé du contenu 2">
+      <p:pic>
+        <p:nvPicPr>
+          <p:cNvPr id="4" name="Espace réservé du contenu 3">
             <a:extLst>
               <a:ext uri="{FF2B5EF4-FFF2-40B4-BE49-F238E27FC236}">
-                <a16:creationId xmlns:a16="http://schemas.microsoft.com/office/drawing/2014/main" id="{232F5410-CC02-4A25-8206-87C63996CD31}"/>
+                <a16:creationId xmlns:a16="http://schemas.microsoft.com/office/drawing/2014/main" id="{DEF3361E-450E-439E-952C-694A6E2A4842}"/>
               </a:ext>
             </a:extLst>
           </p:cNvPr>
-          <p:cNvSpPr>
-            <a:spLocks noGrp="1"/>
-          </p:cNvSpPr>
+          <p:cNvPicPr>
+            <a:picLocks noGrp="1" noChangeAspect="1"/>
+          </p:cNvPicPr>
           <p:nvPr>
             <p:ph idx="1"/>
           </p:nvPr>
-        </p:nvSpPr>
-        <p:spPr/>
-        <p:txBody>
-          <a:bodyPr/>
-          <a:lstStyle/>
-          <a:p>
-            <a:endParaRPr lang="en-GB" dirty="0"/>
-          </a:p>
-        </p:txBody>
-      </p:sp>
+        </p:nvPicPr>
+        <p:blipFill>
+          <a:blip r:embed="rId2"/>
+          <a:stretch>
+            <a:fillRect/>
+          </a:stretch>
+        </p:blipFill>
+        <p:spPr>
+          <a:xfrm>
+            <a:off x="545792" y="1593365"/>
+            <a:ext cx="10511102" cy="3689835"/>
+          </a:xfrm>
+          <a:prstGeom prst="rect">
+            <a:avLst/>
+          </a:prstGeom>
+        </p:spPr>
+      </p:pic>
     </p:spTree>
     <p:extLst>
       <p:ext uri="{BB962C8B-B14F-4D97-AF65-F5344CB8AC3E}">
-        <p14:creationId xmlns:p14="http://schemas.microsoft.com/office/powerpoint/2010/main" val="2737349872"/>
+        <p14:creationId xmlns:p14="http://schemas.microsoft.com/office/powerpoint/2010/main" val="1121874429"/>
       </p:ext>
     </p:extLst>
   </p:cSld>
@@ -7415,4 +8303,299 @@
     </a:ext>
   </a:extLst>
 </a:theme>
+</file>
+
+<file path=ppt/theme/theme2.xml><?xml version="1.0" encoding="utf-8"?>
+<a:theme xmlns:a="http://schemas.openxmlformats.org/drawingml/2006/main" name="Thème Office">
+  <a:themeElements>
+    <a:clrScheme name="Office">
+      <a:dk1>
+        <a:sysClr val="windowText" lastClr="000000"/>
+      </a:dk1>
+      <a:lt1>
+        <a:sysClr val="window" lastClr="FFFFFF"/>
+      </a:lt1>
+      <a:dk2>
+        <a:srgbClr val="44546A"/>
+      </a:dk2>
+      <a:lt2>
+        <a:srgbClr val="E7E6E6"/>
+      </a:lt2>
+      <a:accent1>
+        <a:srgbClr val="4472C4"/>
+      </a:accent1>
+      <a:accent2>
+        <a:srgbClr val="ED7D31"/>
+      </a:accent2>
+      <a:accent3>
+        <a:srgbClr val="A5A5A5"/>
+      </a:accent3>
+      <a:accent4>
+        <a:srgbClr val="FFC000"/>
+      </a:accent4>
+      <a:accent5>
+        <a:srgbClr val="5B9BD5"/>
+      </a:accent5>
+      <a:accent6>
+        <a:srgbClr val="70AD47"/>
+      </a:accent6>
+      <a:hlink>
+        <a:srgbClr val="0563C1"/>
+      </a:hlink>
+      <a:folHlink>
+        <a:srgbClr val="954F72"/>
+      </a:folHlink>
+    </a:clrScheme>
+    <a:fontScheme name="Office">
+      <a:majorFont>
+        <a:latin typeface="Calibri Light" panose="020F0302020204030204"/>
+        <a:ea typeface=""/>
+        <a:cs typeface=""/>
+        <a:font script="Jpan" typeface="游ゴシック Light"/>
+        <a:font script="Hang" typeface="맑은 고딕"/>
+        <a:font script="Hans" typeface="等线 Light"/>
+        <a:font script="Hant" typeface="新細明體"/>
+        <a:font script="Arab" typeface="Times New Roman"/>
+        <a:font script="Hebr" typeface="Times New Roman"/>
+        <a:font script="Thai" typeface="Angsana New"/>
+        <a:font script="Ethi" typeface="Nyala"/>
+        <a:font script="Beng" typeface="Vrinda"/>
+        <a:font script="Gujr" typeface="Shruti"/>
+        <a:font script="Khmr" typeface="MoolBoran"/>
+        <a:font script="Knda" typeface="Tunga"/>
+        <a:font script="Guru" typeface="Raavi"/>
+        <a:font script="Cans" typeface="Euphemia"/>
+        <a:font script="Cher" typeface="Plantagenet Cherokee"/>
+        <a:font script="Yiii" typeface="Microsoft Yi Baiti"/>
+        <a:font script="Tibt" typeface="Microsoft Himalaya"/>
+        <a:font script="Thaa" typeface="MV Boli"/>
+        <a:font script="Deva" typeface="Mangal"/>
+        <a:font script="Telu" typeface="Gautami"/>
+        <a:font script="Taml" typeface="Latha"/>
+        <a:font script="Syrc" typeface="Estrangelo Edessa"/>
+        <a:font script="Orya" typeface="Kalinga"/>
+        <a:font script="Mlym" typeface="Kartika"/>
+        <a:font script="Laoo" typeface="DokChampa"/>
+        <a:font script="Sinh" typeface="Iskoola Pota"/>
+        <a:font script="Mong" typeface="Mongolian Baiti"/>
+        <a:font script="Viet" typeface="Times New Roman"/>
+        <a:font script="Uigh" typeface="Microsoft Uighur"/>
+        <a:font script="Geor" typeface="Sylfaen"/>
+        <a:font script="Armn" typeface="Arial"/>
+        <a:font script="Bugi" typeface="Leelawadee UI"/>
+        <a:font script="Bopo" typeface="Microsoft JhengHei"/>
+        <a:font script="Java" typeface="Javanese Text"/>
+        <a:font script="Lisu" typeface="Segoe UI"/>
+        <a:font script="Mymr" typeface="Myanmar Text"/>
+        <a:font script="Nkoo" typeface="Ebrima"/>
+        <a:font script="Olck" typeface="Nirmala UI"/>
+        <a:font script="Osma" typeface="Ebrima"/>
+        <a:font script="Phag" typeface="Phagspa"/>
+        <a:font script="Syrn" typeface="Estrangelo Edessa"/>
+        <a:font script="Syrj" typeface="Estrangelo Edessa"/>
+        <a:font script="Syre" typeface="Estrangelo Edessa"/>
+        <a:font script="Sora" typeface="Nirmala UI"/>
+        <a:font script="Tale" typeface="Microsoft Tai Le"/>
+        <a:font script="Talu" typeface="Microsoft New Tai Lue"/>
+        <a:font script="Tfng" typeface="Ebrima"/>
+      </a:majorFont>
+      <a:minorFont>
+        <a:latin typeface="Calibri" panose="020F0502020204030204"/>
+        <a:ea typeface=""/>
+        <a:cs typeface=""/>
+        <a:font script="Jpan" typeface="游ゴシック"/>
+        <a:font script="Hang" typeface="맑은 고딕"/>
+        <a:font script="Hans" typeface="等线"/>
+        <a:font script="Hant" typeface="新細明體"/>
+        <a:font script="Arab" typeface="Arial"/>
+        <a:font script="Hebr" typeface="Arial"/>
+        <a:font script="Thai" typeface="Cordia New"/>
+        <a:font script="Ethi" typeface="Nyala"/>
+        <a:font script="Beng" typeface="Vrinda"/>
+        <a:font script="Gujr" typeface="Shruti"/>
+        <a:font script="Khmr" typeface="DaunPenh"/>
+        <a:font script="Knda" typeface="Tunga"/>
+        <a:font script="Guru" typeface="Raavi"/>
+        <a:font script="Cans" typeface="Euphemia"/>
+        <a:font script="Cher" typeface="Plantagenet Cherokee"/>
+        <a:font script="Yiii" typeface="Microsoft Yi Baiti"/>
+        <a:font script="Tibt" typeface="Microsoft Himalaya"/>
+        <a:font script="Thaa" typeface="MV Boli"/>
+        <a:font script="Deva" typeface="Mangal"/>
+        <a:font script="Telu" typeface="Gautami"/>
+        <a:font script="Taml" typeface="Latha"/>
+        <a:font script="Syrc" typeface="Estrangelo Edessa"/>
+        <a:font script="Orya" typeface="Kalinga"/>
+        <a:font script="Mlym" typeface="Kartika"/>
+        <a:font script="Laoo" typeface="DokChampa"/>
+        <a:font script="Sinh" typeface="Iskoola Pota"/>
+        <a:font script="Mong" typeface="Mongolian Baiti"/>
+        <a:font script="Viet" typeface="Arial"/>
+        <a:font script="Uigh" typeface="Microsoft Uighur"/>
+        <a:font script="Geor" typeface="Sylfaen"/>
+        <a:font script="Armn" typeface="Arial"/>
+        <a:font script="Bugi" typeface="Leelawadee UI"/>
+        <a:font script="Bopo" typeface="Microsoft JhengHei"/>
+        <a:font script="Java" typeface="Javanese Text"/>
+        <a:font script="Lisu" typeface="Segoe UI"/>
+        <a:font script="Mymr" typeface="Myanmar Text"/>
+        <a:font script="Nkoo" typeface="Ebrima"/>
+        <a:font script="Olck" typeface="Nirmala UI"/>
+        <a:font script="Osma" typeface="Ebrima"/>
+        <a:font script="Phag" typeface="Phagspa"/>
+        <a:font script="Syrn" typeface="Estrangelo Edessa"/>
+        <a:font script="Syrj" typeface="Estrangelo Edessa"/>
+        <a:font script="Syre" typeface="Estrangelo Edessa"/>
+        <a:font script="Sora" typeface="Nirmala UI"/>
+        <a:font script="Tale" typeface="Microsoft Tai Le"/>
+        <a:font script="Talu" typeface="Microsoft New Tai Lue"/>
+        <a:font script="Tfng" typeface="Ebrima"/>
+      </a:minorFont>
+    </a:fontScheme>
+    <a:fmtScheme name="Office">
+      <a:fillStyleLst>
+        <a:solidFill>
+          <a:schemeClr val="phClr"/>
+        </a:solidFill>
+        <a:gradFill rotWithShape="1">
+          <a:gsLst>
+            <a:gs pos="0">
+              <a:schemeClr val="phClr">
+                <a:lumMod val="110000"/>
+                <a:satMod val="105000"/>
+                <a:tint val="67000"/>
+              </a:schemeClr>
+            </a:gs>
+            <a:gs pos="50000">
+              <a:schemeClr val="phClr">
+                <a:lumMod val="105000"/>
+                <a:satMod val="103000"/>
+                <a:tint val="73000"/>
+              </a:schemeClr>
+            </a:gs>
+            <a:gs pos="100000">
+              <a:schemeClr val="phClr">
+                <a:lumMod val="105000"/>
+                <a:satMod val="109000"/>
+                <a:tint val="81000"/>
+              </a:schemeClr>
+            </a:gs>
+          </a:gsLst>
+          <a:lin ang="5400000" scaled="0"/>
+        </a:gradFill>
+        <a:gradFill rotWithShape="1">
+          <a:gsLst>
+            <a:gs pos="0">
+              <a:schemeClr val="phClr">
+                <a:satMod val="103000"/>
+                <a:lumMod val="102000"/>
+                <a:tint val="94000"/>
+              </a:schemeClr>
+            </a:gs>
+            <a:gs pos="50000">
+              <a:schemeClr val="phClr">
+                <a:satMod val="110000"/>
+                <a:lumMod val="100000"/>
+                <a:shade val="100000"/>
+              </a:schemeClr>
+            </a:gs>
+            <a:gs pos="100000">
+              <a:schemeClr val="phClr">
+                <a:lumMod val="99000"/>
+                <a:satMod val="120000"/>
+                <a:shade val="78000"/>
+              </a:schemeClr>
+            </a:gs>
+          </a:gsLst>
+          <a:lin ang="5400000" scaled="0"/>
+        </a:gradFill>
+      </a:fillStyleLst>
+      <a:lnStyleLst>
+        <a:ln w="6350" cap="flat" cmpd="sng" algn="ctr">
+          <a:solidFill>
+            <a:schemeClr val="phClr"/>
+          </a:solidFill>
+          <a:prstDash val="solid"/>
+          <a:miter lim="800000"/>
+        </a:ln>
+        <a:ln w="12700" cap="flat" cmpd="sng" algn="ctr">
+          <a:solidFill>
+            <a:schemeClr val="phClr"/>
+          </a:solidFill>
+          <a:prstDash val="solid"/>
+          <a:miter lim="800000"/>
+        </a:ln>
+        <a:ln w="19050" cap="flat" cmpd="sng" algn="ctr">
+          <a:solidFill>
+            <a:schemeClr val="phClr"/>
+          </a:solidFill>
+          <a:prstDash val="solid"/>
+          <a:miter lim="800000"/>
+        </a:ln>
+      </a:lnStyleLst>
+      <a:effectStyleLst>
+        <a:effectStyle>
+          <a:effectLst/>
+        </a:effectStyle>
+        <a:effectStyle>
+          <a:effectLst/>
+        </a:effectStyle>
+        <a:effectStyle>
+          <a:effectLst>
+            <a:outerShdw blurRad="57150" dist="19050" dir="5400000" algn="ctr" rotWithShape="0">
+              <a:srgbClr val="000000">
+                <a:alpha val="63000"/>
+              </a:srgbClr>
+            </a:outerShdw>
+          </a:effectLst>
+        </a:effectStyle>
+      </a:effectStyleLst>
+      <a:bgFillStyleLst>
+        <a:solidFill>
+          <a:schemeClr val="phClr"/>
+        </a:solidFill>
+        <a:solidFill>
+          <a:schemeClr val="phClr">
+            <a:tint val="95000"/>
+            <a:satMod val="170000"/>
+          </a:schemeClr>
+        </a:solidFill>
+        <a:gradFill rotWithShape="1">
+          <a:gsLst>
+            <a:gs pos="0">
+              <a:schemeClr val="phClr">
+                <a:tint val="93000"/>
+                <a:satMod val="150000"/>
+                <a:shade val="98000"/>
+                <a:lumMod val="102000"/>
+              </a:schemeClr>
+            </a:gs>
+            <a:gs pos="50000">
+              <a:schemeClr val="phClr">
+                <a:tint val="98000"/>
+                <a:satMod val="130000"/>
+                <a:shade val="90000"/>
+                <a:lumMod val="103000"/>
+              </a:schemeClr>
+            </a:gs>
+            <a:gs pos="100000">
+              <a:schemeClr val="phClr">
+                <a:shade val="63000"/>
+                <a:satMod val="120000"/>
+              </a:schemeClr>
+            </a:gs>
+          </a:gsLst>
+          <a:lin ang="5400000" scaled="0"/>
+        </a:gradFill>
+      </a:bgFillStyleLst>
+    </a:fmtScheme>
+  </a:themeElements>
+  <a:objectDefaults/>
+  <a:extraClrSchemeLst/>
+  <a:extLst>
+    <a:ext uri="{05A4C25C-085E-4340-85A3-A5531E510DB2}">
+      <thm15:themeFamily xmlns:thm15="http://schemas.microsoft.com/office/thememl/2012/main" name="Office Theme" id="{62F939B6-93AF-4DB8-9C6B-D6C7DFDC589F}" vid="{4A3C46E8-61CC-4603-A589-7422A47A8E4A}"/>
+    </a:ext>
+  </a:extLst>
+</a:theme>
 </file>
</xml_diff>

<commit_message>
silver bullet +  hello world avec variable
</commit_message>
<xml_diff>
--- a/PPT/OOPAndGo.pptx
+++ b/PPT/OOPAndGo.pptx
@@ -214,7 +214,7 @@
           <a:p>
             <a:fld id="{5704045B-0300-40B8-906E-48019F9F7CEB}" type="datetimeFigureOut">
               <a:rPr lang="en-GB" smtClean="0"/>
-              <a:t>10/11/2019</a:t>
+              <a:t>11/11/2019</a:t>
             </a:fld>
             <a:endParaRPr lang="en-GB"/>
           </a:p>
@@ -1306,7 +1306,7 @@
           <a:p>
             <a:fld id="{C0C4FB13-012F-4037-81DA-501F3326904A}" type="datetimeFigureOut">
               <a:rPr lang="en-GB" smtClean="0"/>
-              <a:t>10/11/2019</a:t>
+              <a:t>11/11/2019</a:t>
             </a:fld>
             <a:endParaRPr lang="en-GB"/>
           </a:p>
@@ -1557,7 +1557,7 @@
           <a:p>
             <a:fld id="{C0C4FB13-012F-4037-81DA-501F3326904A}" type="datetimeFigureOut">
               <a:rPr lang="en-GB" smtClean="0"/>
-              <a:t>10/11/2019</a:t>
+              <a:t>11/11/2019</a:t>
             </a:fld>
             <a:endParaRPr lang="en-GB"/>
           </a:p>
@@ -1871,7 +1871,7 @@
           <a:p>
             <a:fld id="{C0C4FB13-012F-4037-81DA-501F3326904A}" type="datetimeFigureOut">
               <a:rPr lang="en-GB" smtClean="0"/>
-              <a:t>10/11/2019</a:t>
+              <a:t>11/11/2019</a:t>
             </a:fld>
             <a:endParaRPr lang="en-GB"/>
           </a:p>
@@ -2212,7 +2212,7 @@
           <a:p>
             <a:fld id="{C0C4FB13-012F-4037-81DA-501F3326904A}" type="datetimeFigureOut">
               <a:rPr lang="en-GB" smtClean="0"/>
-              <a:t>10/11/2019</a:t>
+              <a:t>11/11/2019</a:t>
             </a:fld>
             <a:endParaRPr lang="en-GB"/>
           </a:p>
@@ -2526,7 +2526,7 @@
           <a:p>
             <a:fld id="{C0C4FB13-012F-4037-81DA-501F3326904A}" type="datetimeFigureOut">
               <a:rPr lang="en-GB" smtClean="0"/>
-              <a:t>10/11/2019</a:t>
+              <a:t>11/11/2019</a:t>
             </a:fld>
             <a:endParaRPr lang="en-GB"/>
           </a:p>
@@ -2919,7 +2919,7 @@
           <a:p>
             <a:fld id="{C0C4FB13-012F-4037-81DA-501F3326904A}" type="datetimeFigureOut">
               <a:rPr lang="en-GB" smtClean="0"/>
-              <a:t>10/11/2019</a:t>
+              <a:t>11/11/2019</a:t>
             </a:fld>
             <a:endParaRPr lang="en-GB"/>
           </a:p>
@@ -3089,7 +3089,7 @@
           <a:p>
             <a:fld id="{C0C4FB13-012F-4037-81DA-501F3326904A}" type="datetimeFigureOut">
               <a:rPr lang="en-GB" smtClean="0"/>
-              <a:t>10/11/2019</a:t>
+              <a:t>11/11/2019</a:t>
             </a:fld>
             <a:endParaRPr lang="en-GB"/>
           </a:p>
@@ -3269,7 +3269,7 @@
           <a:p>
             <a:fld id="{C0C4FB13-012F-4037-81DA-501F3326904A}" type="datetimeFigureOut">
               <a:rPr lang="en-GB" smtClean="0"/>
-              <a:t>10/11/2019</a:t>
+              <a:t>11/11/2019</a:t>
             </a:fld>
             <a:endParaRPr lang="en-GB"/>
           </a:p>
@@ -3445,7 +3445,7 @@
           <a:p>
             <a:fld id="{C0C4FB13-012F-4037-81DA-501F3326904A}" type="datetimeFigureOut">
               <a:rPr lang="en-GB" smtClean="0"/>
-              <a:t>10/11/2019</a:t>
+              <a:t>11/11/2019</a:t>
             </a:fld>
             <a:endParaRPr lang="en-GB"/>
           </a:p>
@@ -3692,7 +3692,7 @@
           <a:p>
             <a:fld id="{C0C4FB13-012F-4037-81DA-501F3326904A}" type="datetimeFigureOut">
               <a:rPr lang="en-GB" smtClean="0"/>
-              <a:t>10/11/2019</a:t>
+              <a:t>11/11/2019</a:t>
             </a:fld>
             <a:endParaRPr lang="en-GB"/>
           </a:p>
@@ -3924,7 +3924,7 @@
           <a:p>
             <a:fld id="{C0C4FB13-012F-4037-81DA-501F3326904A}" type="datetimeFigureOut">
               <a:rPr lang="en-GB" smtClean="0"/>
-              <a:t>10/11/2019</a:t>
+              <a:t>11/11/2019</a:t>
             </a:fld>
             <a:endParaRPr lang="en-GB"/>
           </a:p>
@@ -4298,7 +4298,7 @@
           <a:p>
             <a:fld id="{C0C4FB13-012F-4037-81DA-501F3326904A}" type="datetimeFigureOut">
               <a:rPr lang="en-GB" smtClean="0"/>
-              <a:t>10/11/2019</a:t>
+              <a:t>11/11/2019</a:t>
             </a:fld>
             <a:endParaRPr lang="en-GB"/>
           </a:p>
@@ -4421,7 +4421,7 @@
           <a:p>
             <a:fld id="{C0C4FB13-012F-4037-81DA-501F3326904A}" type="datetimeFigureOut">
               <a:rPr lang="en-GB" smtClean="0"/>
-              <a:t>10/11/2019</a:t>
+              <a:t>11/11/2019</a:t>
             </a:fld>
             <a:endParaRPr lang="en-GB"/>
           </a:p>
@@ -4516,7 +4516,7 @@
           <a:p>
             <a:fld id="{C0C4FB13-012F-4037-81DA-501F3326904A}" type="datetimeFigureOut">
               <a:rPr lang="en-GB" smtClean="0"/>
-              <a:t>10/11/2019</a:t>
+              <a:t>11/11/2019</a:t>
             </a:fld>
             <a:endParaRPr lang="en-GB"/>
           </a:p>
@@ -4771,7 +4771,7 @@
           <a:p>
             <a:fld id="{C0C4FB13-012F-4037-81DA-501F3326904A}" type="datetimeFigureOut">
               <a:rPr lang="en-GB" smtClean="0"/>
-              <a:t>10/11/2019</a:t>
+              <a:t>11/11/2019</a:t>
             </a:fld>
             <a:endParaRPr lang="en-GB"/>
           </a:p>
@@ -5034,7 +5034,7 @@
           <a:p>
             <a:fld id="{C0C4FB13-012F-4037-81DA-501F3326904A}" type="datetimeFigureOut">
               <a:rPr lang="en-GB" smtClean="0"/>
-              <a:t>10/11/2019</a:t>
+              <a:t>11/11/2019</a:t>
             </a:fld>
             <a:endParaRPr lang="en-GB"/>
           </a:p>
@@ -5777,7 +5777,7 @@
           <a:p>
             <a:fld id="{C0C4FB13-012F-4037-81DA-501F3326904A}" type="datetimeFigureOut">
               <a:rPr lang="en-GB" smtClean="0"/>
-              <a:t>10/11/2019</a:t>
+              <a:t>11/11/2019</a:t>
             </a:fld>
             <a:endParaRPr lang="en-GB"/>
           </a:p>
@@ -6411,16 +6411,8 @@
           <a:lstStyle/>
           <a:p>
             <a:r>
-              <a:rPr lang="fr-BE" dirty="0" err="1"/>
-              <a:t>Prove</a:t>
-            </a:r>
-            <a:r>
               <a:rPr lang="fr-BE" dirty="0"/>
-              <a:t> </a:t>
-            </a:r>
-            <a:r>
-              <a:rPr lang="fr-BE" dirty="0" err="1"/>
-              <a:t>it</a:t>
+              <a:t>Prouve le !</a:t>
             </a:r>
             <a:endParaRPr lang="en-GB" dirty="0"/>
           </a:p>
@@ -6534,7 +6526,7 @@
           <a:p>
             <a:r>
               <a:rPr lang="fr-BE" dirty="0"/>
-              <a:t>Interfaces implémentation</a:t>
+              <a:t>Implémentation des interfaces</a:t>
             </a:r>
             <a:endParaRPr lang="en-GB" dirty="0"/>
           </a:p>
@@ -6564,8 +6556,8 @@
         </p:blipFill>
         <p:spPr>
           <a:xfrm>
-            <a:off x="677334" y="1548127"/>
-            <a:ext cx="5632026" cy="3954806"/>
+            <a:off x="1452975" y="1516595"/>
+            <a:ext cx="7045385" cy="4947266"/>
           </a:xfrm>
           <a:prstGeom prst="rect">
             <a:avLst/>
@@ -6625,7 +6617,7 @@
           <a:p>
             <a:r>
               <a:rPr lang="fr-BE" dirty="0"/>
-              <a:t>Interfaces assignation</a:t>
+              <a:t>Assignation des interfaces</a:t>
             </a:r>
             <a:endParaRPr lang="en-GB" dirty="0"/>
           </a:p>
@@ -6716,7 +6708,7 @@
           <a:p>
             <a:r>
               <a:rPr lang="fr-BE" dirty="0"/>
-              <a:t>Rappel principe (fondamentaux) de l’orienté objet</a:t>
+              <a:t>Rappel des principes (fondamentaux) de l’orienté objet</a:t>
             </a:r>
             <a:endParaRPr lang="en-GB" dirty="0"/>
           </a:p>
@@ -6745,22 +6737,18 @@
           <a:p>
             <a:r>
               <a:rPr lang="fr-BE" dirty="0"/>
-              <a:t>SOLID </a:t>
-            </a:r>
-            <a:r>
-              <a:rPr lang="fr-BE" dirty="0" err="1"/>
-              <a:t>principles</a:t>
-            </a:r>
+              <a:t>Principes SOLID</a:t>
+            </a:r>
+          </a:p>
+          <a:p>
             <a:endParaRPr lang="fr-BE" dirty="0"/>
           </a:p>
           <a:p>
-            <a:endParaRPr lang="fr-BE" dirty="0"/>
-          </a:p>
-          <a:p>
-            <a:r>
-              <a:rPr lang="en-GB" dirty="0"/>
-              <a:t>Polymorphism</a:t>
-            </a:r>
+            <a:r>
+              <a:rPr lang="en-GB" dirty="0" err="1"/>
+              <a:t>Polymorphisme</a:t>
+            </a:r>
+            <a:endParaRPr lang="en-GB" dirty="0"/>
           </a:p>
           <a:p>
             <a:r>
@@ -6859,7 +6847,7 @@
           <a:p>
             <a:r>
               <a:rPr lang="fr-BE" dirty="0"/>
-              <a:t>Rentrer différents type d’objet dans une imbrication</a:t>
+              <a:t>Imbriquer différents type d’objet dans une structure ou un flow</a:t>
             </a:r>
           </a:p>
           <a:p>
@@ -6881,7 +6869,7 @@
         </p:nvSpPr>
         <p:spPr>
           <a:xfrm>
-            <a:off x="3571617" y="3621184"/>
+            <a:off x="3361410" y="3429000"/>
             <a:ext cx="4552849" cy="1107996"/>
           </a:xfrm>
           <a:prstGeom prst="rect">
@@ -7143,7 +7131,7 @@
         </p:nvSpPr>
         <p:spPr>
           <a:xfrm>
-            <a:off x="2296471" y="3333947"/>
+            <a:off x="2917998" y="3429000"/>
             <a:ext cx="5415265" cy="1107996"/>
           </a:xfrm>
           <a:prstGeom prst="rect">
@@ -7537,7 +7525,15 @@
             <a:pPr lvl="1"/>
             <a:r>
               <a:rPr lang="en-GB" dirty="0"/>
-              <a:t>Avec heritage {</a:t>
+              <a:t>Avec </a:t>
+            </a:r>
+            <a:r>
+              <a:rPr lang="en-GB" dirty="0" err="1"/>
+              <a:t>héritage</a:t>
+            </a:r>
+            <a:r>
+              <a:rPr lang="en-GB" dirty="0"/>
+              <a:t> {</a:t>
             </a:r>
             <a:r>
               <a:rPr lang="en-GB" dirty="0" err="1"/>
@@ -7904,6 +7900,22 @@
           <a:bodyPr/>
           <a:lstStyle/>
           <a:p>
+            <a:r>
+              <a:rPr lang="fr-BE" dirty="0"/>
+              <a:t>Pas de </a:t>
+            </a:r>
+            <a:r>
+              <a:rPr lang="fr-BE" dirty="0" err="1"/>
+              <a:t>silver</a:t>
+            </a:r>
+            <a:r>
+              <a:rPr lang="fr-BE" dirty="0"/>
+              <a:t> </a:t>
+            </a:r>
+            <a:r>
+              <a:rPr lang="fr-BE" dirty="0" err="1"/>
+              <a:t>bullet</a:t>
+            </a:r>
             <a:endParaRPr lang="en-GB" dirty="0"/>
           </a:p>
         </p:txBody>
@@ -7929,7 +7941,51 @@
           <a:bodyPr/>
           <a:lstStyle/>
           <a:p>
-            <a:endParaRPr lang="en-GB"/>
+            <a:r>
+              <a:rPr lang="fr-BE" dirty="0" err="1"/>
+              <a:t>Golang</a:t>
+            </a:r>
+            <a:r>
+              <a:rPr lang="fr-BE" dirty="0"/>
+              <a:t> =ok=&gt; OOP</a:t>
+            </a:r>
+          </a:p>
+          <a:p>
+            <a:endParaRPr lang="fr-BE" dirty="0"/>
+          </a:p>
+          <a:p>
+            <a:r>
+              <a:rPr lang="fr-BE" dirty="0"/>
+              <a:t>Performances – Low </a:t>
+            </a:r>
+            <a:r>
+              <a:rPr lang="fr-BE" dirty="0" err="1"/>
+              <a:t>Level</a:t>
+            </a:r>
+            <a:endParaRPr lang="fr-BE" dirty="0"/>
+          </a:p>
+          <a:p>
+            <a:r>
+              <a:rPr lang="en-GB" dirty="0" err="1"/>
+              <a:t>Moderne</a:t>
+            </a:r>
+            <a:r>
+              <a:rPr lang="en-GB" dirty="0"/>
+              <a:t>, facile </a:t>
+            </a:r>
+            <a:r>
+              <a:rPr lang="en-GB" dirty="0" err="1"/>
+              <a:t>d’utilisation</a:t>
+            </a:r>
+            <a:r>
+              <a:rPr lang="en-GB" dirty="0"/>
+              <a:t> – Feature </a:t>
+            </a:r>
+            <a:r>
+              <a:rPr lang="en-GB" dirty="0" err="1"/>
+              <a:t>limité</a:t>
+            </a:r>
+            <a:endParaRPr lang="en-GB" dirty="0"/>
           </a:p>
         </p:txBody>
       </p:sp>
@@ -8188,47 +8244,12 @@
           <a:p>
             <a:r>
               <a:rPr lang="fr-BE" dirty="0"/>
-              <a:t>A quoi ressemble le Go</a:t>
+              <a:t>A quoi ressemble le Go ?</a:t>
             </a:r>
             <a:endParaRPr lang="en-GB" dirty="0"/>
           </a:p>
         </p:txBody>
       </p:sp>
-      <p:pic>
-        <p:nvPicPr>
-          <p:cNvPr id="5" name="Espace réservé du contenu 4" descr="Une image contenant dessin&#10;&#10;Description générée automatiquement">
-            <a:extLst>
-              <a:ext uri="{FF2B5EF4-FFF2-40B4-BE49-F238E27FC236}">
-                <a16:creationId xmlns:a16="http://schemas.microsoft.com/office/drawing/2014/main" id="{EA0EF37E-75D9-4EC2-B318-29710F5CB525}"/>
-              </a:ext>
-            </a:extLst>
-          </p:cNvPr>
-          <p:cNvPicPr>
-            <a:picLocks noGrp="1" noChangeAspect="1"/>
-          </p:cNvPicPr>
-          <p:nvPr>
-            <p:ph idx="1"/>
-          </p:nvPr>
-        </p:nvPicPr>
-        <p:blipFill>
-          <a:blip r:embed="rId2">
-            <a:extLst>
-              <a:ext uri="{28A0092B-C50C-407E-A947-70E740481C1C}">
-                <a14:useLocalDpi xmlns:a14="http://schemas.microsoft.com/office/drawing/2010/main" val="0"/>
-              </a:ext>
-            </a:extLst>
-          </a:blip>
-          <a:stretch>
-            <a:fillRect/>
-          </a:stretch>
-        </p:blipFill>
-        <p:spPr>
-          <a:xfrm>
-            <a:off x="1123211" y="1930400"/>
-            <a:ext cx="3028406" cy="1087120"/>
-          </a:xfrm>
-        </p:spPr>
-      </p:pic>
       <p:pic>
         <p:nvPicPr>
           <p:cNvPr id="7" name="Image 6" descr="Une image contenant dessin, assiette&#10;&#10;Description générée automatiquement">
@@ -8244,7 +8265,7 @@
           <p:nvPr/>
         </p:nvPicPr>
         <p:blipFill>
-          <a:blip r:embed="rId3">
+          <a:blip r:embed="rId2">
             <a:extLst>
               <a:ext uri="{28A0092B-C50C-407E-A947-70E740481C1C}">
                 <a14:useLocalDpi xmlns:a14="http://schemas.microsoft.com/office/drawing/2010/main" val="0"/>
@@ -8360,6 +8381,50 @@
                 <a:schemeClr val="accent1">
                   <a:lumMod val="75000"/>
                 </a:schemeClr>
+              </a:solidFill>
+            </a:endParaRPr>
+          </a:p>
+        </p:txBody>
+      </p:sp>
+      <p:sp>
+        <p:nvSpPr>
+          <p:cNvPr id="4" name="ZoneTexte 3">
+            <a:extLst>
+              <a:ext uri="{FF2B5EF4-FFF2-40B4-BE49-F238E27FC236}">
+                <a16:creationId xmlns:a16="http://schemas.microsoft.com/office/drawing/2014/main" id="{3CC38B00-E4B6-43C9-80FF-5E63B43C8CC9}"/>
+              </a:ext>
+            </a:extLst>
+          </p:cNvPr>
+          <p:cNvSpPr txBox="1"/>
+          <p:nvPr/>
+        </p:nvSpPr>
+        <p:spPr>
+          <a:xfrm>
+            <a:off x="1331151" y="1719284"/>
+            <a:ext cx="3173694" cy="1015663"/>
+          </a:xfrm>
+          <a:prstGeom prst="rect">
+            <a:avLst/>
+          </a:prstGeom>
+          <a:noFill/>
+        </p:spPr>
+        <p:txBody>
+          <a:bodyPr wrap="square" rtlCol="0">
+            <a:spAutoFit/>
+          </a:bodyPr>
+          <a:lstStyle/>
+          <a:p>
+            <a:r>
+              <a:rPr lang="fr-BE" sz="6000" strike="sngStrike" dirty="0">
+                <a:solidFill>
+                  <a:srgbClr val="FF0000"/>
+                </a:solidFill>
+              </a:rPr>
+              <a:t>Classe</a:t>
+            </a:r>
+            <a:endParaRPr lang="en-GB" sz="6000" strike="sngStrike" dirty="0">
+              <a:solidFill>
+                <a:srgbClr val="FF0000"/>
               </a:solidFill>
             </a:endParaRPr>
           </a:p>
@@ -8418,27 +8483,50 @@
           <a:p>
             <a:r>
               <a:rPr lang="fr-BE" dirty="0"/>
-              <a:t>A quoi ressemble le Go</a:t>
+              <a:t>A quoi ressemble le Go ?</a:t>
             </a:r>
             <a:endParaRPr lang="en-GB" dirty="0"/>
+          </a:p>
+        </p:txBody>
+      </p:sp>
+      <p:sp>
+        <p:nvSpPr>
+          <p:cNvPr id="5" name="Espace réservé du contenu 4">
+            <a:extLst>
+              <a:ext uri="{FF2B5EF4-FFF2-40B4-BE49-F238E27FC236}">
+                <a16:creationId xmlns:a16="http://schemas.microsoft.com/office/drawing/2014/main" id="{3901F9AA-807D-48AA-B5B5-1A55928C1E0C}"/>
+              </a:ext>
+            </a:extLst>
+          </p:cNvPr>
+          <p:cNvSpPr>
+            <a:spLocks noGrp="1"/>
+          </p:cNvSpPr>
+          <p:nvPr>
+            <p:ph idx="1"/>
+          </p:nvPr>
+        </p:nvSpPr>
+        <p:spPr/>
+        <p:txBody>
+          <a:bodyPr/>
+          <a:lstStyle/>
+          <a:p>
+            <a:endParaRPr lang="en-GB"/>
           </a:p>
         </p:txBody>
       </p:sp>
       <p:pic>
         <p:nvPicPr>
-          <p:cNvPr id="4" name="Espace réservé du contenu 3">
+          <p:cNvPr id="6" name="Image 5">
             <a:extLst>
               <a:ext uri="{FF2B5EF4-FFF2-40B4-BE49-F238E27FC236}">
-                <a16:creationId xmlns:a16="http://schemas.microsoft.com/office/drawing/2014/main" id="{C3578F35-8D4E-4404-B511-027C6871B66B}"/>
+                <a16:creationId xmlns:a16="http://schemas.microsoft.com/office/drawing/2014/main" id="{41507AEF-FE13-418D-91A1-15BF181D2ADE}"/>
               </a:ext>
             </a:extLst>
           </p:cNvPr>
           <p:cNvPicPr>
-            <a:picLocks noGrp="1" noChangeAspect="1"/>
+            <a:picLocks noChangeAspect="1"/>
           </p:cNvPicPr>
-          <p:nvPr>
-            <p:ph idx="1"/>
-          </p:nvPr>
+          <p:nvPr/>
         </p:nvPicPr>
         <p:blipFill>
           <a:blip r:embed="rId2"/>
@@ -8448,8 +8536,8 @@
         </p:blipFill>
         <p:spPr>
           <a:xfrm>
-            <a:off x="2041967" y="1930399"/>
-            <a:ext cx="6902527" cy="3652961"/>
+            <a:off x="1060563" y="1740900"/>
+            <a:ext cx="10291759" cy="4654644"/>
           </a:xfrm>
           <a:prstGeom prst="rect">
             <a:avLst/>
@@ -8696,7 +8784,7 @@
           <a:p>
             <a:r>
               <a:rPr lang="fr-BE" dirty="0"/>
-              <a:t>Les méthode en Go</a:t>
+              <a:t>Les méthodes en Go</a:t>
             </a:r>
             <a:br>
               <a:rPr lang="fr-BE" dirty="0"/>

</xml_diff>

<commit_message>
fond de PPT en noir
</commit_message>
<xml_diff>
--- a/PPT/OOPAndGo.pptx
+++ b/PPT/OOPAndGo.pptx
@@ -2,7 +2,7 @@
 <file path=ppt/presentation.xml><?xml version="1.0" encoding="utf-8"?>
 <p:presentation xmlns:a="http://schemas.openxmlformats.org/drawingml/2006/main" xmlns:r="http://schemas.openxmlformats.org/officeDocument/2006/relationships" xmlns:p="http://schemas.openxmlformats.org/presentationml/2006/main" saveSubsetFonts="1">
   <p:sldMasterIdLst>
-    <p:sldMasterId id="2147483660" r:id="rId1"/>
+    <p:sldMasterId id="2147483677" r:id="rId1"/>
   </p:sldMasterIdLst>
   <p:notesMasterIdLst>
     <p:notesMasterId r:id="rId20"/>
@@ -214,7 +214,7 @@
           <a:p>
             <a:fld id="{5704045B-0300-40B8-906E-48019F9F7CEB}" type="datetimeFigureOut">
               <a:rPr lang="en-GB" smtClean="0"/>
-              <a:t>11/11/2019</a:t>
+              <a:t>12/11/2019</a:t>
             </a:fld>
             <a:endParaRPr lang="en-GB"/>
           </a:p>
@@ -603,7 +603,7 @@
       </p:grpSpPr>
       <p:grpSp>
         <p:nvGrpSpPr>
-          <p:cNvPr id="7" name="Group 6"/>
+          <p:cNvPr id="8" name="Group 7"/>
           <p:cNvGrpSpPr/>
           <p:nvPr/>
         </p:nvGrpSpPr>
@@ -632,7 +632,8 @@
             <a:ln w="9525">
               <a:solidFill>
                 <a:schemeClr val="bg1">
-                  <a:lumMod val="75000"/>
+                  <a:lumMod val="85000"/>
+                  <a:lumOff val="15000"/>
                 </a:schemeClr>
               </a:solidFill>
             </a:ln>
@@ -670,6 +671,7 @@
               <a:solidFill>
                 <a:schemeClr val="bg1">
                   <a:lumMod val="85000"/>
+                  <a:lumOff val="15000"/>
                 </a:schemeClr>
               </a:solidFill>
             </a:ln>
@@ -1306,7 +1308,7 @@
           <a:p>
             <a:fld id="{C0C4FB13-012F-4037-81DA-501F3326904A}" type="datetimeFigureOut">
               <a:rPr lang="en-GB" smtClean="0"/>
-              <a:t>11/11/2019</a:t>
+              <a:t>12/11/2019</a:t>
             </a:fld>
             <a:endParaRPr lang="en-GB"/>
           </a:p>
@@ -1357,7 +1359,7 @@
     </p:spTree>
     <p:extLst>
       <p:ext uri="{BB962C8B-B14F-4D97-AF65-F5344CB8AC3E}">
-        <p14:creationId xmlns:p14="http://schemas.microsoft.com/office/powerpoint/2010/main" val="907728216"/>
+        <p14:creationId xmlns:p14="http://schemas.microsoft.com/office/powerpoint/2010/main" val="3154456477"/>
       </p:ext>
     </p:extLst>
   </p:cSld>
@@ -1557,7 +1559,7 @@
           <a:p>
             <a:fld id="{C0C4FB13-012F-4037-81DA-501F3326904A}" type="datetimeFigureOut">
               <a:rPr lang="en-GB" smtClean="0"/>
-              <a:t>11/11/2019</a:t>
+              <a:t>12/11/2019</a:t>
             </a:fld>
             <a:endParaRPr lang="en-GB"/>
           </a:p>
@@ -1608,7 +1610,7 @@
     </p:spTree>
     <p:extLst>
       <p:ext uri="{BB962C8B-B14F-4D97-AF65-F5344CB8AC3E}">
-        <p14:creationId xmlns:p14="http://schemas.microsoft.com/office/powerpoint/2010/main" val="1162882880"/>
+        <p14:creationId xmlns:p14="http://schemas.microsoft.com/office/powerpoint/2010/main" val="3919270891"/>
       </p:ext>
     </p:extLst>
   </p:cSld>
@@ -1871,7 +1873,7 @@
           <a:p>
             <a:fld id="{C0C4FB13-012F-4037-81DA-501F3326904A}" type="datetimeFigureOut">
               <a:rPr lang="en-GB" smtClean="0"/>
-              <a:t>11/11/2019</a:t>
+              <a:t>12/11/2019</a:t>
             </a:fld>
             <a:endParaRPr lang="en-GB"/>
           </a:p>
@@ -1947,10 +1949,7 @@
                   <a:noFill/>
                 </a:ln>
                 <a:solidFill>
-                  <a:schemeClr val="accent1">
-                    <a:lumMod val="60000"/>
-                    <a:lumOff val="40000"/>
-                  </a:schemeClr>
+                  <a:schemeClr val="accent1"/>
                 </a:solidFill>
                 <a:effectLst/>
                 <a:latin typeface="Arial"/>
@@ -1988,31 +1987,20 @@
                   <a:noFill/>
                 </a:ln>
                 <a:solidFill>
-                  <a:schemeClr val="accent1">
-                    <a:lumMod val="60000"/>
-                    <a:lumOff val="40000"/>
-                  </a:schemeClr>
+                  <a:schemeClr val="accent1"/>
                 </a:solidFill>
+                <a:effectLst/>
                 <a:latin typeface="Arial"/>
               </a:rPr>
               <a:t>”</a:t>
             </a:r>
-            <a:endParaRPr lang="en-US" dirty="0">
-              <a:solidFill>
-                <a:schemeClr val="accent1">
-                  <a:lumMod val="60000"/>
-                  <a:lumOff val="40000"/>
-                </a:schemeClr>
-              </a:solidFill>
-              <a:latin typeface="Arial"/>
-            </a:endParaRPr>
           </a:p>
         </p:txBody>
       </p:sp>
     </p:spTree>
     <p:extLst>
       <p:ext uri="{BB962C8B-B14F-4D97-AF65-F5344CB8AC3E}">
-        <p14:creationId xmlns:p14="http://schemas.microsoft.com/office/powerpoint/2010/main" val="2607030676"/>
+        <p14:creationId xmlns:p14="http://schemas.microsoft.com/office/powerpoint/2010/main" val="4192500260"/>
       </p:ext>
     </p:extLst>
   </p:cSld>
@@ -2212,7 +2200,7 @@
           <a:p>
             <a:fld id="{C0C4FB13-012F-4037-81DA-501F3326904A}" type="datetimeFigureOut">
               <a:rPr lang="en-GB" smtClean="0"/>
-              <a:t>11/11/2019</a:t>
+              <a:t>12/11/2019</a:t>
             </a:fld>
             <a:endParaRPr lang="en-GB"/>
           </a:p>
@@ -2263,7 +2251,7 @@
     </p:spTree>
     <p:extLst>
       <p:ext uri="{BB962C8B-B14F-4D97-AF65-F5344CB8AC3E}">
-        <p14:creationId xmlns:p14="http://schemas.microsoft.com/office/powerpoint/2010/main" val="3589006452"/>
+        <p14:creationId xmlns:p14="http://schemas.microsoft.com/office/powerpoint/2010/main" val="1868875139"/>
       </p:ext>
     </p:extLst>
   </p:cSld>
@@ -2526,7 +2514,7 @@
           <a:p>
             <a:fld id="{C0C4FB13-012F-4037-81DA-501F3326904A}" type="datetimeFigureOut">
               <a:rPr lang="en-GB" smtClean="0"/>
-              <a:t>11/11/2019</a:t>
+              <a:t>12/11/2019</a:t>
             </a:fld>
             <a:endParaRPr lang="en-GB"/>
           </a:p>
@@ -2602,10 +2590,7 @@
                   <a:noFill/>
                 </a:ln>
                 <a:solidFill>
-                  <a:schemeClr val="accent1">
-                    <a:lumMod val="60000"/>
-                    <a:lumOff val="40000"/>
-                  </a:schemeClr>
+                  <a:schemeClr val="accent1"/>
                 </a:solidFill>
                 <a:effectLst/>
                 <a:latin typeface="Arial"/>
@@ -2643,10 +2628,7 @@
                   <a:noFill/>
                 </a:ln>
                 <a:solidFill>
-                  <a:schemeClr val="accent1">
-                    <a:lumMod val="60000"/>
-                    <a:lumOff val="40000"/>
-                  </a:schemeClr>
+                  <a:schemeClr val="accent1"/>
                 </a:solidFill>
                 <a:effectLst/>
                 <a:latin typeface="Arial"/>
@@ -2659,7 +2641,7 @@
     </p:spTree>
     <p:extLst>
       <p:ext uri="{BB962C8B-B14F-4D97-AF65-F5344CB8AC3E}">
-        <p14:creationId xmlns:p14="http://schemas.microsoft.com/office/powerpoint/2010/main" val="2207909343"/>
+        <p14:creationId xmlns:p14="http://schemas.microsoft.com/office/powerpoint/2010/main" val="3453475045"/>
       </p:ext>
     </p:extLst>
   </p:cSld>
@@ -2919,7 +2901,7 @@
           <a:p>
             <a:fld id="{C0C4FB13-012F-4037-81DA-501F3326904A}" type="datetimeFigureOut">
               <a:rPr lang="en-GB" smtClean="0"/>
-              <a:t>11/11/2019</a:t>
+              <a:t>12/11/2019</a:t>
             </a:fld>
             <a:endParaRPr lang="en-GB"/>
           </a:p>
@@ -2970,7 +2952,7 @@
     </p:spTree>
     <p:extLst>
       <p:ext uri="{BB962C8B-B14F-4D97-AF65-F5344CB8AC3E}">
-        <p14:creationId xmlns:p14="http://schemas.microsoft.com/office/powerpoint/2010/main" val="936076110"/>
+        <p14:creationId xmlns:p14="http://schemas.microsoft.com/office/powerpoint/2010/main" val="1540555064"/>
       </p:ext>
     </p:extLst>
   </p:cSld>
@@ -3089,7 +3071,7 @@
           <a:p>
             <a:fld id="{C0C4FB13-012F-4037-81DA-501F3326904A}" type="datetimeFigureOut">
               <a:rPr lang="en-GB" smtClean="0"/>
-              <a:t>11/11/2019</a:t>
+              <a:t>12/11/2019</a:t>
             </a:fld>
             <a:endParaRPr lang="en-GB"/>
           </a:p>
@@ -3140,7 +3122,7 @@
     </p:spTree>
     <p:extLst>
       <p:ext uri="{BB962C8B-B14F-4D97-AF65-F5344CB8AC3E}">
-        <p14:creationId xmlns:p14="http://schemas.microsoft.com/office/powerpoint/2010/main" val="2149379239"/>
+        <p14:creationId xmlns:p14="http://schemas.microsoft.com/office/powerpoint/2010/main" val="3446439915"/>
       </p:ext>
     </p:extLst>
   </p:cSld>
@@ -3269,7 +3251,7 @@
           <a:p>
             <a:fld id="{C0C4FB13-012F-4037-81DA-501F3326904A}" type="datetimeFigureOut">
               <a:rPr lang="en-GB" smtClean="0"/>
-              <a:t>11/11/2019</a:t>
+              <a:t>12/11/2019</a:t>
             </a:fld>
             <a:endParaRPr lang="en-GB"/>
           </a:p>
@@ -3320,7 +3302,7 @@
     </p:spTree>
     <p:extLst>
       <p:ext uri="{BB962C8B-B14F-4D97-AF65-F5344CB8AC3E}">
-        <p14:creationId xmlns:p14="http://schemas.microsoft.com/office/powerpoint/2010/main" val="694704147"/>
+        <p14:creationId xmlns:p14="http://schemas.microsoft.com/office/powerpoint/2010/main" val="1796806107"/>
       </p:ext>
     </p:extLst>
   </p:cSld>
@@ -3445,7 +3427,7 @@
           <a:p>
             <a:fld id="{C0C4FB13-012F-4037-81DA-501F3326904A}" type="datetimeFigureOut">
               <a:rPr lang="en-GB" smtClean="0"/>
-              <a:t>11/11/2019</a:t>
+              <a:t>12/11/2019</a:t>
             </a:fld>
             <a:endParaRPr lang="en-GB"/>
           </a:p>
@@ -3496,7 +3478,7 @@
     </p:spTree>
     <p:extLst>
       <p:ext uri="{BB962C8B-B14F-4D97-AF65-F5344CB8AC3E}">
-        <p14:creationId xmlns:p14="http://schemas.microsoft.com/office/powerpoint/2010/main" val="891869584"/>
+        <p14:creationId xmlns:p14="http://schemas.microsoft.com/office/powerpoint/2010/main" val="1690127161"/>
       </p:ext>
     </p:extLst>
   </p:cSld>
@@ -3692,7 +3674,7 @@
           <a:p>
             <a:fld id="{C0C4FB13-012F-4037-81DA-501F3326904A}" type="datetimeFigureOut">
               <a:rPr lang="en-GB" smtClean="0"/>
-              <a:t>11/11/2019</a:t>
+              <a:t>12/11/2019</a:t>
             </a:fld>
             <a:endParaRPr lang="en-GB"/>
           </a:p>
@@ -3743,7 +3725,7 @@
     </p:spTree>
     <p:extLst>
       <p:ext uri="{BB962C8B-B14F-4D97-AF65-F5344CB8AC3E}">
-        <p14:creationId xmlns:p14="http://schemas.microsoft.com/office/powerpoint/2010/main" val="1627195533"/>
+        <p14:creationId xmlns:p14="http://schemas.microsoft.com/office/powerpoint/2010/main" val="362353991"/>
       </p:ext>
     </p:extLst>
   </p:cSld>
@@ -3924,7 +3906,7 @@
           <a:p>
             <a:fld id="{C0C4FB13-012F-4037-81DA-501F3326904A}" type="datetimeFigureOut">
               <a:rPr lang="en-GB" smtClean="0"/>
-              <a:t>11/11/2019</a:t>
+              <a:t>12/11/2019</a:t>
             </a:fld>
             <a:endParaRPr lang="en-GB"/>
           </a:p>
@@ -3975,7 +3957,7 @@
     </p:spTree>
     <p:extLst>
       <p:ext uri="{BB962C8B-B14F-4D97-AF65-F5344CB8AC3E}">
-        <p14:creationId xmlns:p14="http://schemas.microsoft.com/office/powerpoint/2010/main" val="2809027059"/>
+        <p14:creationId xmlns:p14="http://schemas.microsoft.com/office/powerpoint/2010/main" val="1384156703"/>
       </p:ext>
     </p:extLst>
   </p:cSld>
@@ -4298,7 +4280,7 @@
           <a:p>
             <a:fld id="{C0C4FB13-012F-4037-81DA-501F3326904A}" type="datetimeFigureOut">
               <a:rPr lang="en-GB" smtClean="0"/>
-              <a:t>11/11/2019</a:t>
+              <a:t>12/11/2019</a:t>
             </a:fld>
             <a:endParaRPr lang="en-GB"/>
           </a:p>
@@ -4349,7 +4331,7 @@
     </p:spTree>
     <p:extLst>
       <p:ext uri="{BB962C8B-B14F-4D97-AF65-F5344CB8AC3E}">
-        <p14:creationId xmlns:p14="http://schemas.microsoft.com/office/powerpoint/2010/main" val="2910635178"/>
+        <p14:creationId xmlns:p14="http://schemas.microsoft.com/office/powerpoint/2010/main" val="2072402796"/>
       </p:ext>
     </p:extLst>
   </p:cSld>
@@ -4421,7 +4403,7 @@
           <a:p>
             <a:fld id="{C0C4FB13-012F-4037-81DA-501F3326904A}" type="datetimeFigureOut">
               <a:rPr lang="en-GB" smtClean="0"/>
-              <a:t>11/11/2019</a:t>
+              <a:t>12/11/2019</a:t>
             </a:fld>
             <a:endParaRPr lang="en-GB"/>
           </a:p>
@@ -4472,7 +4454,7 @@
     </p:spTree>
     <p:extLst>
       <p:ext uri="{BB962C8B-B14F-4D97-AF65-F5344CB8AC3E}">
-        <p14:creationId xmlns:p14="http://schemas.microsoft.com/office/powerpoint/2010/main" val="1931643127"/>
+        <p14:creationId xmlns:p14="http://schemas.microsoft.com/office/powerpoint/2010/main" val="2950638824"/>
       </p:ext>
     </p:extLst>
   </p:cSld>
@@ -4516,7 +4498,7 @@
           <a:p>
             <a:fld id="{C0C4FB13-012F-4037-81DA-501F3326904A}" type="datetimeFigureOut">
               <a:rPr lang="en-GB" smtClean="0"/>
-              <a:t>11/11/2019</a:t>
+              <a:t>12/11/2019</a:t>
             </a:fld>
             <a:endParaRPr lang="en-GB"/>
           </a:p>
@@ -4567,7 +4549,7 @@
     </p:spTree>
     <p:extLst>
       <p:ext uri="{BB962C8B-B14F-4D97-AF65-F5344CB8AC3E}">
-        <p14:creationId xmlns:p14="http://schemas.microsoft.com/office/powerpoint/2010/main" val="2008634094"/>
+        <p14:creationId xmlns:p14="http://schemas.microsoft.com/office/powerpoint/2010/main" val="3717129581"/>
       </p:ext>
     </p:extLst>
   </p:cSld>
@@ -4771,7 +4753,7 @@
           <a:p>
             <a:fld id="{C0C4FB13-012F-4037-81DA-501F3326904A}" type="datetimeFigureOut">
               <a:rPr lang="en-GB" smtClean="0"/>
-              <a:t>11/11/2019</a:t>
+              <a:t>12/11/2019</a:t>
             </a:fld>
             <a:endParaRPr lang="en-GB"/>
           </a:p>
@@ -4822,7 +4804,7 @@
     </p:spTree>
     <p:extLst>
       <p:ext uri="{BB962C8B-B14F-4D97-AF65-F5344CB8AC3E}">
-        <p14:creationId xmlns:p14="http://schemas.microsoft.com/office/powerpoint/2010/main" val="3122603510"/>
+        <p14:creationId xmlns:p14="http://schemas.microsoft.com/office/powerpoint/2010/main" val="2257749793"/>
       </p:ext>
     </p:extLst>
   </p:cSld>
@@ -5034,7 +5016,7 @@
           <a:p>
             <a:fld id="{C0C4FB13-012F-4037-81DA-501F3326904A}" type="datetimeFigureOut">
               <a:rPr lang="en-GB" smtClean="0"/>
-              <a:t>11/11/2019</a:t>
+              <a:t>12/11/2019</a:t>
             </a:fld>
             <a:endParaRPr lang="en-GB"/>
           </a:p>
@@ -5085,7 +5067,7 @@
     </p:spTree>
     <p:extLst>
       <p:ext uri="{BB962C8B-B14F-4D97-AF65-F5344CB8AC3E}">
-        <p14:creationId xmlns:p14="http://schemas.microsoft.com/office/powerpoint/2010/main" val="72297211"/>
+        <p14:creationId xmlns:p14="http://schemas.microsoft.com/office/powerpoint/2010/main" val="4208075686"/>
       </p:ext>
     </p:extLst>
   </p:cSld>
@@ -5100,7 +5082,7 @@
   <p:cSld>
     <p:bg>
       <p:bgRef idx="1001">
-        <a:schemeClr val="bg1"/>
+        <a:schemeClr val="bg2"/>
       </p:bgRef>
     </p:bg>
     <p:spTree>
@@ -5119,7 +5101,7 @@
       </p:grpSpPr>
       <p:grpSp>
         <p:nvGrpSpPr>
-          <p:cNvPr id="7" name="Group 6"/>
+          <p:cNvPr id="8" name="Group 7"/>
           <p:cNvGrpSpPr/>
           <p:nvPr/>
         </p:nvGrpSpPr>
@@ -5148,7 +5130,8 @@
             <a:ln w="9525">
               <a:solidFill>
                 <a:schemeClr val="bg1">
-                  <a:lumMod val="75000"/>
+                  <a:lumMod val="85000"/>
+                  <a:lumOff val="15000"/>
                 </a:schemeClr>
               </a:solidFill>
             </a:ln>
@@ -5186,6 +5169,7 @@
               <a:solidFill>
                 <a:schemeClr val="bg1">
                   <a:lumMod val="85000"/>
+                  <a:lumOff val="15000"/>
                 </a:schemeClr>
               </a:solidFill>
             </a:ln>
@@ -5777,7 +5761,7 @@
           <a:p>
             <a:fld id="{C0C4FB13-012F-4037-81DA-501F3326904A}" type="datetimeFigureOut">
               <a:rPr lang="en-GB" smtClean="0"/>
-              <a:t>11/11/2019</a:t>
+              <a:t>12/11/2019</a:t>
             </a:fld>
             <a:endParaRPr lang="en-GB"/>
           </a:p>
@@ -5862,28 +5846,28 @@
     </p:spTree>
     <p:extLst>
       <p:ext uri="{BB962C8B-B14F-4D97-AF65-F5344CB8AC3E}">
-        <p14:creationId xmlns:p14="http://schemas.microsoft.com/office/powerpoint/2010/main" val="2685494323"/>
+        <p14:creationId xmlns:p14="http://schemas.microsoft.com/office/powerpoint/2010/main" val="1270679886"/>
       </p:ext>
     </p:extLst>
   </p:cSld>
-  <p:clrMap bg1="lt1" tx1="dk1" bg2="lt2" tx2="dk2" accent1="accent1" accent2="accent2" accent3="accent3" accent4="accent4" accent5="accent5" accent6="accent6" hlink="hlink" folHlink="folHlink"/>
+  <p:clrMap bg1="dk1" tx1="lt1" bg2="dk2" tx2="lt2" accent1="accent1" accent2="accent2" accent3="accent3" accent4="accent4" accent5="accent5" accent6="accent6" hlink="hlink" folHlink="folHlink"/>
   <p:sldLayoutIdLst>
-    <p:sldLayoutId id="2147483661" r:id="rId1"/>
-    <p:sldLayoutId id="2147483662" r:id="rId2"/>
-    <p:sldLayoutId id="2147483663" r:id="rId3"/>
-    <p:sldLayoutId id="2147483664" r:id="rId4"/>
-    <p:sldLayoutId id="2147483665" r:id="rId5"/>
-    <p:sldLayoutId id="2147483666" r:id="rId6"/>
-    <p:sldLayoutId id="2147483667" r:id="rId7"/>
-    <p:sldLayoutId id="2147483668" r:id="rId8"/>
-    <p:sldLayoutId id="2147483669" r:id="rId9"/>
-    <p:sldLayoutId id="2147483670" r:id="rId10"/>
-    <p:sldLayoutId id="2147483671" r:id="rId11"/>
-    <p:sldLayoutId id="2147483672" r:id="rId12"/>
-    <p:sldLayoutId id="2147483673" r:id="rId13"/>
-    <p:sldLayoutId id="2147483674" r:id="rId14"/>
-    <p:sldLayoutId id="2147483675" r:id="rId15"/>
-    <p:sldLayoutId id="2147483676" r:id="rId16"/>
+    <p:sldLayoutId id="2147483678" r:id="rId1"/>
+    <p:sldLayoutId id="2147483679" r:id="rId2"/>
+    <p:sldLayoutId id="2147483680" r:id="rId3"/>
+    <p:sldLayoutId id="2147483681" r:id="rId4"/>
+    <p:sldLayoutId id="2147483682" r:id="rId5"/>
+    <p:sldLayoutId id="2147483683" r:id="rId6"/>
+    <p:sldLayoutId id="2147483684" r:id="rId7"/>
+    <p:sldLayoutId id="2147483685" r:id="rId8"/>
+    <p:sldLayoutId id="2147483686" r:id="rId9"/>
+    <p:sldLayoutId id="2147483687" r:id="rId10"/>
+    <p:sldLayoutId id="2147483688" r:id="rId11"/>
+    <p:sldLayoutId id="2147483689" r:id="rId12"/>
+    <p:sldLayoutId id="2147483690" r:id="rId13"/>
+    <p:sldLayoutId id="2147483691" r:id="rId14"/>
+    <p:sldLayoutId id="2147483692" r:id="rId15"/>
+    <p:sldLayoutId id="2147483693" r:id="rId16"/>
   </p:sldLayoutIdLst>
   <p:txStyles>
     <p:titleStyle>
@@ -8772,12 +8756,7 @@
             <p:ph type="title"/>
           </p:nvPr>
         </p:nvSpPr>
-        <p:spPr>
-          <a:xfrm>
-            <a:off x="677334" y="609600"/>
-            <a:ext cx="8596668" cy="1320800"/>
-          </a:xfrm>
-        </p:spPr>
+        <p:spPr/>
         <p:txBody>
           <a:bodyPr/>
           <a:lstStyle/>
@@ -9337,7 +9316,7 @@
   <a:extraClrSchemeLst/>
   <a:extLst>
     <a:ext uri="{05A4C25C-085E-4340-85A3-A5531E510DB2}">
-      <thm15:themeFamily xmlns:thm15="http://schemas.microsoft.com/office/thememl/2012/main" name="Facet" id="{C0C680CD-088A-49FC-A102-D699147F32B2}" vid="{CFBC31BA-B70F-4F30-BCAA-4F3011E16C4D}"/>
+      <thm15:themeFamily xmlns:thm15="http://schemas.microsoft.com/office/thememl/2012/main" name="Facet" id="{C0C680CD-088A-49FC-A102-D699147F32B2}" vid="{8C59B386-999D-4CB6-B907-9F3997C027CC}"/>
     </a:ext>
   </a:extLst>
 </a:theme>

</xml_diff>